<commit_message>
Update UndoRedoStack to UndoRedoCareTaker
The undo/redo mechanism uses 2 different stacks previously to store
and the UndoableCommands that we can undo or redo.

Since we are now keeping track of the linear timeline of address
book states, using a single List to store the address book states
is more suitable compared to 2 separate Stacks.

Let's update UndoRedoStack to UndoRedoCareTaker, and store the
address book states in a List instead with a pointer to keep track of
the current address book state of the app. Let's also update the
DeveloperGuide to reflect this change.
</commit_message>
<xml_diff>
--- a/docs/diagrams/ModelComponentClassBetterOopDiagram.pptx
+++ b/docs/diagrams/ModelComponentClassBetterOopDiagram.pptx
@@ -208,7 +208,7 @@
           <a:p>
             <a:fld id="{F5CC4B3F-88C1-4FFA-B1B6-F41C21DC6924}" type="datetimeFigureOut">
               <a:rPr lang="en-US" smtClean="0"/>
-              <a:t>4/16/2018</a:t>
+              <a:t>4/17/2018</a:t>
             </a:fld>
             <a:endParaRPr lang="en-US"/>
           </a:p>
@@ -654,7 +654,7 @@
           <a:p>
             <a:fld id="{78C97017-6FC3-485B-9764-EAC9E56C1D49}" type="datetimeFigureOut">
               <a:rPr lang="en-US" smtClean="0"/>
-              <a:t>4/16/2018</a:t>
+              <a:t>4/17/2018</a:t>
             </a:fld>
             <a:endParaRPr lang="en-US"/>
           </a:p>
@@ -822,7 +822,7 @@
           <a:p>
             <a:fld id="{78C97017-6FC3-485B-9764-EAC9E56C1D49}" type="datetimeFigureOut">
               <a:rPr lang="en-US" smtClean="0"/>
-              <a:t>4/16/2018</a:t>
+              <a:t>4/17/2018</a:t>
             </a:fld>
             <a:endParaRPr lang="en-US"/>
           </a:p>
@@ -1000,7 +1000,7 @@
           <a:p>
             <a:fld id="{78C97017-6FC3-485B-9764-EAC9E56C1D49}" type="datetimeFigureOut">
               <a:rPr lang="en-US" smtClean="0"/>
-              <a:t>4/16/2018</a:t>
+              <a:t>4/17/2018</a:t>
             </a:fld>
             <a:endParaRPr lang="en-US"/>
           </a:p>
@@ -1168,7 +1168,7 @@
           <a:p>
             <a:fld id="{78C97017-6FC3-485B-9764-EAC9E56C1D49}" type="datetimeFigureOut">
               <a:rPr lang="en-US" smtClean="0"/>
-              <a:t>4/16/2018</a:t>
+              <a:t>4/17/2018</a:t>
             </a:fld>
             <a:endParaRPr lang="en-US"/>
           </a:p>
@@ -1413,7 +1413,7 @@
           <a:p>
             <a:fld id="{78C97017-6FC3-485B-9764-EAC9E56C1D49}" type="datetimeFigureOut">
               <a:rPr lang="en-US" smtClean="0"/>
-              <a:t>4/16/2018</a:t>
+              <a:t>4/17/2018</a:t>
             </a:fld>
             <a:endParaRPr lang="en-US"/>
           </a:p>
@@ -1698,7 +1698,7 @@
           <a:p>
             <a:fld id="{78C97017-6FC3-485B-9764-EAC9E56C1D49}" type="datetimeFigureOut">
               <a:rPr lang="en-US" smtClean="0"/>
-              <a:t>4/16/2018</a:t>
+              <a:t>4/17/2018</a:t>
             </a:fld>
             <a:endParaRPr lang="en-US"/>
           </a:p>
@@ -2117,7 +2117,7 @@
           <a:p>
             <a:fld id="{78C97017-6FC3-485B-9764-EAC9E56C1D49}" type="datetimeFigureOut">
               <a:rPr lang="en-US" smtClean="0"/>
-              <a:t>4/16/2018</a:t>
+              <a:t>4/17/2018</a:t>
             </a:fld>
             <a:endParaRPr lang="en-US"/>
           </a:p>
@@ -2234,7 +2234,7 @@
           <a:p>
             <a:fld id="{78C97017-6FC3-485B-9764-EAC9E56C1D49}" type="datetimeFigureOut">
               <a:rPr lang="en-US" smtClean="0"/>
-              <a:t>4/16/2018</a:t>
+              <a:t>4/17/2018</a:t>
             </a:fld>
             <a:endParaRPr lang="en-US"/>
           </a:p>
@@ -2329,7 +2329,7 @@
           <a:p>
             <a:fld id="{78C97017-6FC3-485B-9764-EAC9E56C1D49}" type="datetimeFigureOut">
               <a:rPr lang="en-US" smtClean="0"/>
-              <a:t>4/16/2018</a:t>
+              <a:t>4/17/2018</a:t>
             </a:fld>
             <a:endParaRPr lang="en-US"/>
           </a:p>
@@ -2604,7 +2604,7 @@
           <a:p>
             <a:fld id="{78C97017-6FC3-485B-9764-EAC9E56C1D49}" type="datetimeFigureOut">
               <a:rPr lang="en-US" smtClean="0"/>
-              <a:t>4/16/2018</a:t>
+              <a:t>4/17/2018</a:t>
             </a:fld>
             <a:endParaRPr lang="en-US"/>
           </a:p>
@@ -2856,7 +2856,7 @@
           <a:p>
             <a:fld id="{78C97017-6FC3-485B-9764-EAC9E56C1D49}" type="datetimeFigureOut">
               <a:rPr lang="en-US" smtClean="0"/>
-              <a:t>4/16/2018</a:t>
+              <a:t>4/17/2018</a:t>
             </a:fld>
             <a:endParaRPr lang="en-US"/>
           </a:p>
@@ -3067,7 +3067,7 @@
           <a:p>
             <a:fld id="{78C97017-6FC3-485B-9764-EAC9E56C1D49}" type="datetimeFigureOut">
               <a:rPr lang="en-US" smtClean="0"/>
-              <a:t>4/16/2018</a:t>
+              <a:t>4/17/2018</a:t>
             </a:fld>
             <a:endParaRPr lang="en-US"/>
           </a:p>
@@ -5942,8 +5942,8 @@
         </p:nvSpPr>
         <p:spPr>
           <a:xfrm>
-            <a:off x="1436463" y="2013872"/>
-            <a:ext cx="1154338" cy="338573"/>
+            <a:off x="1219200" y="2013872"/>
+            <a:ext cx="1371601" cy="338573"/>
           </a:xfrm>
           <a:prstGeom prst="rect">
             <a:avLst/>
@@ -5980,7 +5980,7 @@
                   <a:srgbClr val="7030A0"/>
                 </a:solidFill>
               </a:rPr>
-              <a:t>UndoRedoStack</a:t>
+              <a:t>UndoRedoCareTaker</a:t>
             </a:r>
             <a:endParaRPr lang="en-SG" sz="1050" dirty="0">
               <a:solidFill>

</xml_diff>

<commit_message>
modified illustration on better oop diagram in `model`
</commit_message>
<xml_diff>
--- a/docs/diagrams/ModelComponentClassBetterOopDiagram.pptx
+++ b/docs/diagrams/ModelComponentClassBetterOopDiagram.pptx
@@ -208,7 +208,7 @@
           <a:p>
             <a:fld id="{F5CC4B3F-88C1-4FFA-B1B6-F41C21DC6924}" type="datetimeFigureOut">
               <a:rPr lang="en-US" smtClean="0"/>
-              <a:t>12/5/2018</a:t>
+              <a:t>4/10/2019</a:t>
             </a:fld>
             <a:endParaRPr lang="en-US"/>
           </a:p>
@@ -654,7 +654,7 @@
           <a:p>
             <a:fld id="{78C97017-6FC3-485B-9764-EAC9E56C1D49}" type="datetimeFigureOut">
               <a:rPr lang="en-US" smtClean="0"/>
-              <a:t>12/5/2018</a:t>
+              <a:t>4/10/2019</a:t>
             </a:fld>
             <a:endParaRPr lang="en-US"/>
           </a:p>
@@ -822,7 +822,7 @@
           <a:p>
             <a:fld id="{78C97017-6FC3-485B-9764-EAC9E56C1D49}" type="datetimeFigureOut">
               <a:rPr lang="en-US" smtClean="0"/>
-              <a:t>12/5/2018</a:t>
+              <a:t>4/10/2019</a:t>
             </a:fld>
             <a:endParaRPr lang="en-US"/>
           </a:p>
@@ -1000,7 +1000,7 @@
           <a:p>
             <a:fld id="{78C97017-6FC3-485B-9764-EAC9E56C1D49}" type="datetimeFigureOut">
               <a:rPr lang="en-US" smtClean="0"/>
-              <a:t>12/5/2018</a:t>
+              <a:t>4/10/2019</a:t>
             </a:fld>
             <a:endParaRPr lang="en-US"/>
           </a:p>
@@ -1168,7 +1168,7 @@
           <a:p>
             <a:fld id="{78C97017-6FC3-485B-9764-EAC9E56C1D49}" type="datetimeFigureOut">
               <a:rPr lang="en-US" smtClean="0"/>
-              <a:t>12/5/2018</a:t>
+              <a:t>4/10/2019</a:t>
             </a:fld>
             <a:endParaRPr lang="en-US"/>
           </a:p>
@@ -1413,7 +1413,7 @@
           <a:p>
             <a:fld id="{78C97017-6FC3-485B-9764-EAC9E56C1D49}" type="datetimeFigureOut">
               <a:rPr lang="en-US" smtClean="0"/>
-              <a:t>12/5/2018</a:t>
+              <a:t>4/10/2019</a:t>
             </a:fld>
             <a:endParaRPr lang="en-US"/>
           </a:p>
@@ -1698,7 +1698,7 @@
           <a:p>
             <a:fld id="{78C97017-6FC3-485B-9764-EAC9E56C1D49}" type="datetimeFigureOut">
               <a:rPr lang="en-US" smtClean="0"/>
-              <a:t>12/5/2018</a:t>
+              <a:t>4/10/2019</a:t>
             </a:fld>
             <a:endParaRPr lang="en-US"/>
           </a:p>
@@ -2117,7 +2117,7 @@
           <a:p>
             <a:fld id="{78C97017-6FC3-485B-9764-EAC9E56C1D49}" type="datetimeFigureOut">
               <a:rPr lang="en-US" smtClean="0"/>
-              <a:t>12/5/2018</a:t>
+              <a:t>4/10/2019</a:t>
             </a:fld>
             <a:endParaRPr lang="en-US"/>
           </a:p>
@@ -2234,7 +2234,7 @@
           <a:p>
             <a:fld id="{78C97017-6FC3-485B-9764-EAC9E56C1D49}" type="datetimeFigureOut">
               <a:rPr lang="en-US" smtClean="0"/>
-              <a:t>12/5/2018</a:t>
+              <a:t>4/10/2019</a:t>
             </a:fld>
             <a:endParaRPr lang="en-US"/>
           </a:p>
@@ -2329,7 +2329,7 @@
           <a:p>
             <a:fld id="{78C97017-6FC3-485B-9764-EAC9E56C1D49}" type="datetimeFigureOut">
               <a:rPr lang="en-US" smtClean="0"/>
-              <a:t>12/5/2018</a:t>
+              <a:t>4/10/2019</a:t>
             </a:fld>
             <a:endParaRPr lang="en-US"/>
           </a:p>
@@ -2604,7 +2604,7 @@
           <a:p>
             <a:fld id="{78C97017-6FC3-485B-9764-EAC9E56C1D49}" type="datetimeFigureOut">
               <a:rPr lang="en-US" smtClean="0"/>
-              <a:t>12/5/2018</a:t>
+              <a:t>4/10/2019</a:t>
             </a:fld>
             <a:endParaRPr lang="en-US"/>
           </a:p>
@@ -2856,7 +2856,7 @@
           <a:p>
             <a:fld id="{78C97017-6FC3-485B-9764-EAC9E56C1D49}" type="datetimeFigureOut">
               <a:rPr lang="en-US" smtClean="0"/>
-              <a:t>12/5/2018</a:t>
+              <a:t>4/10/2019</a:t>
             </a:fld>
             <a:endParaRPr lang="en-US"/>
           </a:p>
@@ -3067,7 +3067,7 @@
           <a:p>
             <a:fld id="{78C97017-6FC3-485B-9764-EAC9E56C1D49}" type="datetimeFigureOut">
               <a:rPr lang="en-US" smtClean="0"/>
-              <a:t>12/5/2018</a:t>
+              <a:t>4/10/2019</a:t>
             </a:fld>
             <a:endParaRPr lang="en-US"/>
           </a:p>
@@ -3442,1370 +3442,1197 @@
           <a:chExt cx="0" cy="0"/>
         </a:xfrm>
       </p:grpSpPr>
-      <p:sp>
-        <p:nvSpPr>
-          <p:cNvPr id="46" name="Rectangle 8"/>
-          <p:cNvSpPr/>
+      <p:grpSp>
+        <p:nvGrpSpPr>
+          <p:cNvPr id="3" name="Group 2">
+            <a:extLst>
+              <a:ext uri="{FF2B5EF4-FFF2-40B4-BE49-F238E27FC236}">
+                <a16:creationId xmlns:a16="http://schemas.microsoft.com/office/drawing/2014/main" id="{627C4768-7789-474A-ABDA-C9EE74DBF0AA}"/>
+              </a:ext>
+            </a:extLst>
+          </p:cNvPr>
+          <p:cNvGrpSpPr/>
           <p:nvPr/>
-        </p:nvSpPr>
-        <p:spPr>
+        </p:nvGrpSpPr>
+        <p:grpSpPr>
           <a:xfrm>
-            <a:off x="1754912" y="3324621"/>
-            <a:ext cx="1447688" cy="346760"/>
+            <a:off x="1600201" y="2549336"/>
+            <a:ext cx="6095565" cy="1436351"/>
+            <a:chOff x="1600201" y="2549336"/>
+            <a:chExt cx="6095565" cy="1436351"/>
           </a:xfrm>
-          <a:prstGeom prst="rect">
-            <a:avLst/>
-          </a:prstGeom>
-          <a:ln w="19050">
+        </p:grpSpPr>
+        <p:sp>
+          <p:nvSpPr>
+            <p:cNvPr id="46" name="Rectangle 8"/>
+            <p:cNvSpPr/>
+            <p:nvPr/>
+          </p:nvSpPr>
+          <p:spPr>
+            <a:xfrm>
+              <a:off x="1600201" y="3324621"/>
+              <a:ext cx="1602400" cy="346760"/>
+            </a:xfrm>
+            <a:prstGeom prst="rect">
+              <a:avLst/>
+            </a:prstGeom>
+            <a:ln w="19050">
+              <a:solidFill>
+                <a:srgbClr val="7030A0"/>
+              </a:solidFill>
+            </a:ln>
+            <a:effectLst/>
+          </p:spPr>
+          <p:style>
+            <a:lnRef idx="1">
+              <a:schemeClr val="accent4"/>
+            </a:lnRef>
+            <a:fillRef idx="2">
+              <a:schemeClr val="accent4"/>
+            </a:fillRef>
+            <a:effectRef idx="1">
+              <a:schemeClr val="accent4"/>
+            </a:effectRef>
+            <a:fontRef idx="minor">
+              <a:schemeClr val="dk1"/>
+            </a:fontRef>
+          </p:style>
+          <p:txBody>
+            <a:bodyPr rtlCol="0" anchor="ctr"/>
+            <a:lstStyle/>
+            <a:p>
+              <a:pPr algn="ctr"/>
+              <a:r>
+                <a:rPr lang="en-US" sz="1050" dirty="0" err="1">
+                  <a:solidFill>
+                    <a:srgbClr val="7030A0"/>
+                  </a:solidFill>
+                </a:rPr>
+                <a:t>VersionedExpenditureList</a:t>
+              </a:r>
+              <a:endParaRPr lang="en-SG" sz="1050" dirty="0">
+                <a:solidFill>
+                  <a:srgbClr val="7030A0"/>
+                </a:solidFill>
+              </a:endParaRPr>
+            </a:p>
+          </p:txBody>
+        </p:sp>
+        <p:sp>
+          <p:nvSpPr>
+            <p:cNvPr id="49" name="Rectangle 8"/>
+            <p:cNvSpPr/>
+            <p:nvPr/>
+          </p:nvSpPr>
+          <p:spPr>
+            <a:xfrm>
+              <a:off x="3730715" y="3353144"/>
+              <a:ext cx="1156969" cy="346760"/>
+            </a:xfrm>
+            <a:prstGeom prst="rect">
+              <a:avLst/>
+            </a:prstGeom>
+            <a:ln w="19050">
+              <a:solidFill>
+                <a:srgbClr val="7030A0"/>
+              </a:solidFill>
+            </a:ln>
+            <a:effectLst/>
+          </p:spPr>
+          <p:style>
+            <a:lnRef idx="1">
+              <a:schemeClr val="accent4"/>
+            </a:lnRef>
+            <a:fillRef idx="2">
+              <a:schemeClr val="accent4"/>
+            </a:fillRef>
+            <a:effectRef idx="1">
+              <a:schemeClr val="accent4"/>
+            </a:effectRef>
+            <a:fontRef idx="minor">
+              <a:schemeClr val="dk1"/>
+            </a:fontRef>
+          </p:style>
+          <p:txBody>
+            <a:bodyPr rtlCol="0" anchor="ctr"/>
+            <a:lstStyle/>
+            <a:p>
+              <a:pPr algn="ctr"/>
+              <a:r>
+                <a:rPr lang="en-US" sz="1050" dirty="0" err="1">
+                  <a:solidFill>
+                    <a:srgbClr val="7030A0"/>
+                  </a:solidFill>
+                </a:rPr>
+                <a:t>PurchaseList</a:t>
+              </a:r>
+              <a:endParaRPr lang="en-SG" sz="1050" dirty="0">
+                <a:solidFill>
+                  <a:srgbClr val="7030A0"/>
+                </a:solidFill>
+              </a:endParaRPr>
+            </a:p>
+          </p:txBody>
+        </p:sp>
+        <p:sp>
+          <p:nvSpPr>
+            <p:cNvPr id="51" name="Flowchart: Decision 96"/>
+            <p:cNvSpPr/>
+            <p:nvPr/>
+          </p:nvSpPr>
+          <p:spPr>
+            <a:xfrm>
+              <a:off x="3201752" y="3437911"/>
+              <a:ext cx="236048" cy="173380"/>
+            </a:xfrm>
+            <a:prstGeom prst="flowChartDecision">
+              <a:avLst/>
+            </a:prstGeom>
             <a:solidFill>
               <a:srgbClr val="7030A0"/>
             </a:solidFill>
-          </a:ln>
-          <a:effectLst/>
-        </p:spPr>
-        <p:style>
-          <a:lnRef idx="1">
-            <a:schemeClr val="accent4"/>
-          </a:lnRef>
-          <a:fillRef idx="2">
-            <a:schemeClr val="accent4"/>
-          </a:fillRef>
-          <a:effectRef idx="1">
-            <a:schemeClr val="accent4"/>
-          </a:effectRef>
-          <a:fontRef idx="minor">
-            <a:schemeClr val="dk1"/>
-          </a:fontRef>
-        </p:style>
-        <p:txBody>
-          <a:bodyPr rtlCol="0" anchor="ctr"/>
-          <a:lstStyle/>
-          <a:p>
-            <a:pPr algn="ctr"/>
-            <a:r>
-              <a:rPr lang="en-US" sz="1050" dirty="0" err="1">
+            <a:ln w="19050">
+              <a:solidFill>
+                <a:srgbClr val="7030A0"/>
+              </a:solidFill>
+            </a:ln>
+            <a:effectLst/>
+          </p:spPr>
+          <p:style>
+            <a:lnRef idx="1">
+              <a:schemeClr val="accent6"/>
+            </a:lnRef>
+            <a:fillRef idx="2">
+              <a:schemeClr val="accent6"/>
+            </a:fillRef>
+            <a:effectRef idx="1">
+              <a:schemeClr val="accent6"/>
+            </a:effectRef>
+            <a:fontRef idx="minor">
+              <a:schemeClr val="dk1"/>
+            </a:fontRef>
+          </p:style>
+          <p:txBody>
+            <a:bodyPr rtlCol="0" anchor="ctr"/>
+            <a:lstStyle/>
+            <a:p>
+              <a:pPr algn="ctr"/>
+              <a:endParaRPr lang="en-US" sz="1050"/>
+            </a:p>
+          </p:txBody>
+        </p:sp>
+        <p:cxnSp>
+          <p:nvCxnSpPr>
+            <p:cNvPr id="30" name="Elbow Connector 29"/>
+            <p:cNvCxnSpPr>
+              <a:stCxn id="51" idx="3"/>
+              <a:endCxn id="49" idx="1"/>
+            </p:cNvCxnSpPr>
+            <p:nvPr/>
+          </p:nvCxnSpPr>
+          <p:spPr>
+            <a:xfrm>
+              <a:off x="3437800" y="3524601"/>
+              <a:ext cx="292915" cy="1923"/>
+            </a:xfrm>
+            <a:prstGeom prst="bentConnector3">
+              <a:avLst/>
+            </a:prstGeom>
+            <a:ln w="19050">
+              <a:solidFill>
+                <a:srgbClr val="7030A0"/>
+              </a:solidFill>
+              <a:headEnd type="none" w="med" len="med"/>
+              <a:tailEnd type="arrow" w="med" len="med"/>
+            </a:ln>
+            <a:effectLst/>
+          </p:spPr>
+          <p:style>
+            <a:lnRef idx="1">
+              <a:schemeClr val="accent2"/>
+            </a:lnRef>
+            <a:fillRef idx="2">
+              <a:schemeClr val="accent2"/>
+            </a:fillRef>
+            <a:effectRef idx="1">
+              <a:schemeClr val="accent2"/>
+            </a:effectRef>
+            <a:fontRef idx="minor">
+              <a:schemeClr val="dk1"/>
+            </a:fontRef>
+          </p:style>
+        </p:cxnSp>
+        <p:sp>
+          <p:nvSpPr>
+            <p:cNvPr id="62" name="Rectangle 8"/>
+            <p:cNvSpPr/>
+            <p:nvPr/>
+          </p:nvSpPr>
+          <p:spPr>
+            <a:xfrm>
+              <a:off x="5282183" y="3347776"/>
+              <a:ext cx="708186" cy="346760"/>
+            </a:xfrm>
+            <a:prstGeom prst="rect">
+              <a:avLst/>
+            </a:prstGeom>
+            <a:ln w="19050">
+              <a:solidFill>
+                <a:srgbClr val="7030A0"/>
+              </a:solidFill>
+            </a:ln>
+            <a:effectLst/>
+          </p:spPr>
+          <p:style>
+            <a:lnRef idx="1">
+              <a:schemeClr val="accent4"/>
+            </a:lnRef>
+            <a:fillRef idx="2">
+              <a:schemeClr val="accent4"/>
+            </a:fillRef>
+            <a:effectRef idx="1">
+              <a:schemeClr val="accent4"/>
+            </a:effectRef>
+            <a:fontRef idx="minor">
+              <a:schemeClr val="dk1"/>
+            </a:fontRef>
+          </p:style>
+          <p:txBody>
+            <a:bodyPr rtlCol="0" anchor="ctr"/>
+            <a:lstStyle/>
+            <a:p>
+              <a:pPr algn="ctr"/>
+              <a:r>
+                <a:rPr lang="en-US" sz="1050" dirty="0">
+                  <a:solidFill>
+                    <a:srgbClr val="7030A0"/>
+                  </a:solidFill>
+                </a:rPr>
+                <a:t>Purchase</a:t>
+              </a:r>
+              <a:endParaRPr lang="en-SG" sz="1050" dirty="0">
                 <a:solidFill>
                   <a:srgbClr val="7030A0"/>
                 </a:solidFill>
-              </a:rPr>
-              <a:t>VersionedAddressBook</a:t>
-            </a:r>
-            <a:endParaRPr lang="en-SG" sz="1050" dirty="0">
+              </a:endParaRPr>
+            </a:p>
+          </p:txBody>
+        </p:sp>
+        <p:sp>
+          <p:nvSpPr>
+            <p:cNvPr id="63" name="Flowchart: Decision 96"/>
+            <p:cNvSpPr/>
+            <p:nvPr/>
+          </p:nvSpPr>
+          <p:spPr>
+            <a:xfrm>
+              <a:off x="4886966" y="3430775"/>
+              <a:ext cx="236048" cy="173380"/>
+            </a:xfrm>
+            <a:prstGeom prst="flowChartDecision">
+              <a:avLst/>
+            </a:prstGeom>
+            <a:noFill/>
+            <a:ln w="19050">
               <a:solidFill>
                 <a:srgbClr val="7030A0"/>
               </a:solidFill>
-            </a:endParaRPr>
-          </a:p>
-        </p:txBody>
-      </p:sp>
-      <p:sp>
-        <p:nvSpPr>
-          <p:cNvPr id="49" name="Rectangle 8"/>
-          <p:cNvSpPr/>
-          <p:nvPr/>
-        </p:nvSpPr>
-        <p:spPr>
-          <a:xfrm>
-            <a:off x="3730715" y="3353144"/>
-            <a:ext cx="1156969" cy="346760"/>
-          </a:xfrm>
-          <a:prstGeom prst="rect">
-            <a:avLst/>
-          </a:prstGeom>
-          <a:ln w="19050">
+            </a:ln>
+            <a:effectLst/>
+          </p:spPr>
+          <p:style>
+            <a:lnRef idx="1">
+              <a:schemeClr val="accent6"/>
+            </a:lnRef>
+            <a:fillRef idx="2">
+              <a:schemeClr val="accent6"/>
+            </a:fillRef>
+            <a:effectRef idx="1">
+              <a:schemeClr val="accent6"/>
+            </a:effectRef>
+            <a:fontRef idx="minor">
+              <a:schemeClr val="dk1"/>
+            </a:fontRef>
+          </p:style>
+          <p:txBody>
+            <a:bodyPr rtlCol="0" anchor="ctr"/>
+            <a:lstStyle/>
+            <a:p>
+              <a:pPr algn="ctr"/>
+              <a:endParaRPr lang="en-US" sz="1050"/>
+            </a:p>
+          </p:txBody>
+        </p:sp>
+        <p:cxnSp>
+          <p:nvCxnSpPr>
+            <p:cNvPr id="64" name="Elbow Connector 63"/>
+            <p:cNvCxnSpPr>
+              <a:cxnSpLocks/>
+              <a:stCxn id="63" idx="3"/>
+              <a:endCxn id="62" idx="1"/>
+            </p:cNvCxnSpPr>
+            <p:nvPr/>
+          </p:nvCxnSpPr>
+          <p:spPr>
+            <a:xfrm>
+              <a:off x="5123014" y="3517465"/>
+              <a:ext cx="159169" cy="3691"/>
+            </a:xfrm>
+            <a:prstGeom prst="bentConnector3">
+              <a:avLst/>
+            </a:prstGeom>
+            <a:ln w="19050">
+              <a:solidFill>
+                <a:srgbClr val="7030A0"/>
+              </a:solidFill>
+              <a:headEnd type="none" w="med" len="med"/>
+              <a:tailEnd type="arrow" w="med" len="med"/>
+            </a:ln>
+            <a:effectLst/>
+          </p:spPr>
+          <p:style>
+            <a:lnRef idx="1">
+              <a:schemeClr val="accent2"/>
+            </a:lnRef>
+            <a:fillRef idx="2">
+              <a:schemeClr val="accent2"/>
+            </a:fillRef>
+            <a:effectRef idx="1">
+              <a:schemeClr val="accent2"/>
+            </a:effectRef>
+            <a:fontRef idx="minor">
+              <a:schemeClr val="dk1"/>
+            </a:fontRef>
+          </p:style>
+        </p:cxnSp>
+        <p:sp>
+          <p:nvSpPr>
+            <p:cNvPr id="76" name="Rectangle 8"/>
+            <p:cNvSpPr/>
+            <p:nvPr/>
+          </p:nvSpPr>
+          <p:spPr>
+            <a:xfrm>
+              <a:off x="6680902" y="3053948"/>
+              <a:ext cx="1014864" cy="285783"/>
+            </a:xfrm>
+            <a:prstGeom prst="rect">
+              <a:avLst/>
+            </a:prstGeom>
+            <a:ln w="19050">
+              <a:solidFill>
+                <a:srgbClr val="7030A0"/>
+              </a:solidFill>
+            </a:ln>
+            <a:effectLst/>
+          </p:spPr>
+          <p:style>
+            <a:lnRef idx="1">
+              <a:schemeClr val="accent4"/>
+            </a:lnRef>
+            <a:fillRef idx="2">
+              <a:schemeClr val="accent4"/>
+            </a:fillRef>
+            <a:effectRef idx="1">
+              <a:schemeClr val="accent4"/>
+            </a:effectRef>
+            <a:fontRef idx="minor">
+              <a:schemeClr val="dk1"/>
+            </a:fontRef>
+          </p:style>
+          <p:txBody>
+            <a:bodyPr rtlCol="0" anchor="ctr"/>
+            <a:lstStyle/>
+            <a:p>
+              <a:pPr algn="ctr"/>
+              <a:r>
+                <a:rPr lang="en-US" sz="1050" dirty="0" err="1">
+                  <a:solidFill>
+                    <a:srgbClr val="7030A0"/>
+                  </a:solidFill>
+                </a:rPr>
+                <a:t>PurchaseName</a:t>
+              </a:r>
+              <a:endParaRPr lang="en-SG" sz="1050" dirty="0">
+                <a:solidFill>
+                  <a:srgbClr val="7030A0"/>
+                </a:solidFill>
+              </a:endParaRPr>
+            </a:p>
+          </p:txBody>
+        </p:sp>
+        <p:sp>
+          <p:nvSpPr>
+            <p:cNvPr id="78" name="Flowchart: Decision 96"/>
+            <p:cNvSpPr/>
+            <p:nvPr/>
+          </p:nvSpPr>
+          <p:spPr>
+            <a:xfrm>
+              <a:off x="6010453" y="3437911"/>
+              <a:ext cx="236048" cy="173380"/>
+            </a:xfrm>
+            <a:prstGeom prst="flowChartDecision">
+              <a:avLst/>
+            </a:prstGeom>
             <a:solidFill>
               <a:srgbClr val="7030A0"/>
             </a:solidFill>
-          </a:ln>
-          <a:effectLst/>
-        </p:spPr>
-        <p:style>
-          <a:lnRef idx="1">
-            <a:schemeClr val="accent4"/>
-          </a:lnRef>
-          <a:fillRef idx="2">
-            <a:schemeClr val="accent4"/>
-          </a:fillRef>
-          <a:effectRef idx="1">
-            <a:schemeClr val="accent4"/>
-          </a:effectRef>
-          <a:fontRef idx="minor">
-            <a:schemeClr val="dk1"/>
-          </a:fontRef>
-        </p:style>
-        <p:txBody>
-          <a:bodyPr rtlCol="0" anchor="ctr"/>
-          <a:lstStyle/>
-          <a:p>
-            <a:pPr algn="ctr"/>
-            <a:r>
-              <a:rPr lang="en-US" sz="1050" dirty="0" err="1">
+            <a:ln w="19050">
+              <a:solidFill>
+                <a:srgbClr val="7030A0"/>
+              </a:solidFill>
+            </a:ln>
+            <a:effectLst/>
+          </p:spPr>
+          <p:style>
+            <a:lnRef idx="1">
+              <a:schemeClr val="accent6"/>
+            </a:lnRef>
+            <a:fillRef idx="2">
+              <a:schemeClr val="accent6"/>
+            </a:fillRef>
+            <a:effectRef idx="1">
+              <a:schemeClr val="accent6"/>
+            </a:effectRef>
+            <a:fontRef idx="minor">
+              <a:schemeClr val="dk1"/>
+            </a:fontRef>
+          </p:style>
+          <p:txBody>
+            <a:bodyPr rtlCol="0" anchor="ctr"/>
+            <a:lstStyle/>
+            <a:p>
+              <a:pPr algn="ctr"/>
+              <a:endParaRPr lang="en-US" sz="1050"/>
+            </a:p>
+          </p:txBody>
+        </p:sp>
+        <p:cxnSp>
+          <p:nvCxnSpPr>
+            <p:cNvPr id="79" name="Elbow Connector 78"/>
+            <p:cNvCxnSpPr>
+              <a:cxnSpLocks/>
+            </p:cNvCxnSpPr>
+            <p:nvPr/>
+          </p:nvCxnSpPr>
+          <p:spPr>
+            <a:xfrm flipV="1">
+              <a:off x="6246501" y="3196531"/>
+              <a:ext cx="434402" cy="327761"/>
+            </a:xfrm>
+            <a:prstGeom prst="bentConnector3">
+              <a:avLst/>
+            </a:prstGeom>
+            <a:ln w="19050">
+              <a:solidFill>
+                <a:srgbClr val="7030A0"/>
+              </a:solidFill>
+              <a:headEnd type="none" w="med" len="med"/>
+              <a:tailEnd type="arrow" w="med" len="med"/>
+            </a:ln>
+            <a:effectLst/>
+          </p:spPr>
+          <p:style>
+            <a:lnRef idx="1">
+              <a:schemeClr val="accent2"/>
+            </a:lnRef>
+            <a:fillRef idx="2">
+              <a:schemeClr val="accent2"/>
+            </a:fillRef>
+            <a:effectRef idx="1">
+              <a:schemeClr val="accent2"/>
+            </a:effectRef>
+            <a:fontRef idx="minor">
+              <a:schemeClr val="dk1"/>
+            </a:fontRef>
+          </p:style>
+        </p:cxnSp>
+        <p:sp>
+          <p:nvSpPr>
+            <p:cNvPr id="83" name="Rectangle 8"/>
+            <p:cNvSpPr/>
+            <p:nvPr/>
+          </p:nvSpPr>
+          <p:spPr>
+            <a:xfrm>
+              <a:off x="6680903" y="3699904"/>
+              <a:ext cx="1014862" cy="285783"/>
+            </a:xfrm>
+            <a:prstGeom prst="rect">
+              <a:avLst/>
+            </a:prstGeom>
+            <a:ln w="19050">
+              <a:solidFill>
+                <a:srgbClr val="7030A0"/>
+              </a:solidFill>
+            </a:ln>
+            <a:effectLst/>
+          </p:spPr>
+          <p:style>
+            <a:lnRef idx="1">
+              <a:schemeClr val="accent4"/>
+            </a:lnRef>
+            <a:fillRef idx="2">
+              <a:schemeClr val="accent4"/>
+            </a:fillRef>
+            <a:effectRef idx="1">
+              <a:schemeClr val="accent4"/>
+            </a:effectRef>
+            <a:fontRef idx="minor">
+              <a:schemeClr val="dk1"/>
+            </a:fontRef>
+          </p:style>
+          <p:txBody>
+            <a:bodyPr rtlCol="0" anchor="ctr"/>
+            <a:lstStyle/>
+            <a:p>
+              <a:pPr algn="ctr"/>
+              <a:r>
+                <a:rPr lang="en-US" sz="1050" dirty="0">
+                  <a:solidFill>
+                    <a:srgbClr val="7030A0"/>
+                  </a:solidFill>
+                </a:rPr>
+                <a:t>Price</a:t>
+              </a:r>
+              <a:endParaRPr lang="en-SG" sz="1050" dirty="0">
                 <a:solidFill>
                   <a:srgbClr val="7030A0"/>
                 </a:solidFill>
-              </a:rPr>
-              <a:t>UniquePersonList</a:t>
-            </a:r>
-            <a:endParaRPr lang="en-SG" sz="1050" dirty="0">
+              </a:endParaRPr>
+            </a:p>
+          </p:txBody>
+        </p:sp>
+        <p:cxnSp>
+          <p:nvCxnSpPr>
+            <p:cNvPr id="84" name="Elbow Connector 83"/>
+            <p:cNvCxnSpPr>
+              <a:cxnSpLocks/>
+              <a:stCxn id="78" idx="3"/>
+              <a:endCxn id="83" idx="1"/>
+            </p:cNvCxnSpPr>
+            <p:nvPr/>
+          </p:nvCxnSpPr>
+          <p:spPr>
+            <a:xfrm>
+              <a:off x="6246501" y="3524601"/>
+              <a:ext cx="434402" cy="318195"/>
+            </a:xfrm>
+            <a:prstGeom prst="bentConnector3">
+              <a:avLst/>
+            </a:prstGeom>
+            <a:ln w="19050">
               <a:solidFill>
                 <a:srgbClr val="7030A0"/>
               </a:solidFill>
-            </a:endParaRPr>
-          </a:p>
-        </p:txBody>
-      </p:sp>
-      <p:sp>
-        <p:nvSpPr>
-          <p:cNvPr id="51" name="Flowchart: Decision 96"/>
-          <p:cNvSpPr/>
-          <p:nvPr/>
-        </p:nvSpPr>
-        <p:spPr>
-          <a:xfrm>
-            <a:off x="3201752" y="3437911"/>
-            <a:ext cx="236048" cy="173380"/>
-          </a:xfrm>
-          <a:prstGeom prst="flowChartDecision">
-            <a:avLst/>
-          </a:prstGeom>
-          <a:solidFill>
-            <a:srgbClr val="7030A0"/>
-          </a:solidFill>
-          <a:ln w="19050">
+              <a:headEnd type="none" w="med" len="med"/>
+              <a:tailEnd type="arrow" w="med" len="med"/>
+            </a:ln>
+            <a:effectLst/>
+          </p:spPr>
+          <p:style>
+            <a:lnRef idx="1">
+              <a:schemeClr val="accent2"/>
+            </a:lnRef>
+            <a:fillRef idx="2">
+              <a:schemeClr val="accent2"/>
+            </a:fillRef>
+            <a:effectRef idx="1">
+              <a:schemeClr val="accent2"/>
+            </a:effectRef>
+            <a:fontRef idx="minor">
+              <a:schemeClr val="dk1"/>
+            </a:fontRef>
+          </p:style>
+        </p:cxnSp>
+        <p:sp>
+          <p:nvSpPr>
+            <p:cNvPr id="54" name="TextBox 53"/>
+            <p:cNvSpPr txBox="1"/>
+            <p:nvPr/>
+          </p:nvSpPr>
+          <p:spPr>
+            <a:xfrm>
+              <a:off x="3293478" y="3548574"/>
+              <a:ext cx="189257" cy="178683"/>
+            </a:xfrm>
+            <a:prstGeom prst="rect">
+              <a:avLst/>
+            </a:prstGeom>
+            <a:noFill/>
+          </p:spPr>
+          <p:txBody>
+            <a:bodyPr wrap="square" lIns="0" tIns="0" rIns="0" bIns="0" rtlCol="0">
+              <a:noAutofit/>
+            </a:bodyPr>
+            <a:lstStyle/>
+            <a:p>
+              <a:pPr algn="ctr"/>
+              <a:r>
+                <a:rPr lang="en-US" sz="1100" dirty="0">
+                  <a:solidFill>
+                    <a:srgbClr val="7030A0"/>
+                  </a:solidFill>
+                </a:rPr>
+                <a:t>1</a:t>
+              </a:r>
+              <a:endParaRPr lang="en-SG" sz="1100" dirty="0">
+                <a:solidFill>
+                  <a:srgbClr val="7030A0"/>
+                </a:solidFill>
+              </a:endParaRPr>
+            </a:p>
+          </p:txBody>
+        </p:sp>
+        <p:sp>
+          <p:nvSpPr>
+            <p:cNvPr id="61" name="TextBox 60"/>
+            <p:cNvSpPr txBox="1"/>
+            <p:nvPr/>
+          </p:nvSpPr>
+          <p:spPr>
+            <a:xfrm>
+              <a:off x="5103762" y="3587627"/>
+              <a:ext cx="189257" cy="178683"/>
+            </a:xfrm>
+            <a:prstGeom prst="rect">
+              <a:avLst/>
+            </a:prstGeom>
+            <a:noFill/>
+          </p:spPr>
+          <p:txBody>
+            <a:bodyPr wrap="square" lIns="0" tIns="0" rIns="0" bIns="0" rtlCol="0">
+              <a:noAutofit/>
+            </a:bodyPr>
+            <a:lstStyle/>
+            <a:p>
+              <a:pPr algn="ctr"/>
+              <a:r>
+                <a:rPr lang="en-US" sz="1100" dirty="0">
+                  <a:solidFill>
+                    <a:srgbClr val="7030A0"/>
+                  </a:solidFill>
+                </a:rPr>
+                <a:t>*</a:t>
+              </a:r>
+              <a:endParaRPr lang="en-SG" sz="1100" dirty="0">
+                <a:solidFill>
+                  <a:srgbClr val="7030A0"/>
+                </a:solidFill>
+              </a:endParaRPr>
+            </a:p>
+          </p:txBody>
+        </p:sp>
+        <p:sp>
+          <p:nvSpPr>
+            <p:cNvPr id="52" name="Rectangle 8">
+              <a:extLst>
+                <a:ext uri="{FF2B5EF4-FFF2-40B4-BE49-F238E27FC236}">
+                  <a16:creationId xmlns:a16="http://schemas.microsoft.com/office/drawing/2014/main" id="{ABDCDBD2-131A-4B66-A2F2-43BBEE82C773}"/>
+                </a:ext>
+              </a:extLst>
+            </p:cNvPr>
+            <p:cNvSpPr/>
+            <p:nvPr/>
+          </p:nvSpPr>
+          <p:spPr>
+            <a:xfrm>
+              <a:off x="3724378" y="2696571"/>
+              <a:ext cx="1156969" cy="285783"/>
+            </a:xfrm>
+            <a:prstGeom prst="rect">
+              <a:avLst/>
+            </a:prstGeom>
+            <a:ln w="19050">
+              <a:solidFill>
+                <a:srgbClr val="7030A0"/>
+              </a:solidFill>
+            </a:ln>
+            <a:effectLst/>
+          </p:spPr>
+          <p:style>
+            <a:lnRef idx="1">
+              <a:schemeClr val="accent4"/>
+            </a:lnRef>
+            <a:fillRef idx="2">
+              <a:schemeClr val="accent4"/>
+            </a:fillRef>
+            <a:effectRef idx="1">
+              <a:schemeClr val="accent4"/>
+            </a:effectRef>
+            <a:fontRef idx="minor">
+              <a:schemeClr val="dk1"/>
+            </a:fontRef>
+          </p:style>
+          <p:txBody>
+            <a:bodyPr rtlCol="0" anchor="ctr"/>
+            <a:lstStyle/>
+            <a:p>
+              <a:pPr algn="ctr"/>
+              <a:r>
+                <a:rPr lang="en-US" sz="1050" dirty="0" err="1">
+                  <a:solidFill>
+                    <a:srgbClr val="7030A0"/>
+                  </a:solidFill>
+                </a:rPr>
+                <a:t>UniqueTagList</a:t>
+              </a:r>
+              <a:endParaRPr lang="en-SG" sz="1050" dirty="0">
+                <a:solidFill>
+                  <a:srgbClr val="7030A0"/>
+                </a:solidFill>
+              </a:endParaRPr>
+            </a:p>
+          </p:txBody>
+        </p:sp>
+        <p:cxnSp>
+          <p:nvCxnSpPr>
+            <p:cNvPr id="53" name="Elbow Connector 78">
+              <a:extLst>
+                <a:ext uri="{FF2B5EF4-FFF2-40B4-BE49-F238E27FC236}">
+                  <a16:creationId xmlns:a16="http://schemas.microsoft.com/office/drawing/2014/main" id="{B97967F8-618A-448B-81FD-CDFD4AF0EC64}"/>
+                </a:ext>
+              </a:extLst>
+            </p:cNvPr>
+            <p:cNvCxnSpPr>
+              <a:cxnSpLocks/>
+              <a:stCxn id="54" idx="0"/>
+              <a:endCxn id="52" idx="1"/>
+            </p:cNvCxnSpPr>
+            <p:nvPr/>
+          </p:nvCxnSpPr>
+          <p:spPr>
+            <a:xfrm rot="5400000" flipH="1" flipV="1">
+              <a:off x="3201687" y="3025884"/>
+              <a:ext cx="709111" cy="336271"/>
+            </a:xfrm>
+            <a:prstGeom prst="bentConnector2">
+              <a:avLst/>
+            </a:prstGeom>
+            <a:ln w="19050">
+              <a:solidFill>
+                <a:srgbClr val="7030A0"/>
+              </a:solidFill>
+              <a:headEnd type="none" w="med" len="med"/>
+              <a:tailEnd type="arrow" w="med" len="med"/>
+            </a:ln>
+            <a:effectLst/>
+          </p:spPr>
+          <p:style>
+            <a:lnRef idx="1">
+              <a:schemeClr val="accent2"/>
+            </a:lnRef>
+            <a:fillRef idx="2">
+              <a:schemeClr val="accent2"/>
+            </a:fillRef>
+            <a:effectRef idx="1">
+              <a:schemeClr val="accent2"/>
+            </a:effectRef>
+            <a:fontRef idx="minor">
+              <a:schemeClr val="dk1"/>
+            </a:fontRef>
+          </p:style>
+        </p:cxnSp>
+        <p:sp>
+          <p:nvSpPr>
+            <p:cNvPr id="50" name="TextBox 49">
+              <a:extLst>
+                <a:ext uri="{FF2B5EF4-FFF2-40B4-BE49-F238E27FC236}">
+                  <a16:creationId xmlns:a16="http://schemas.microsoft.com/office/drawing/2014/main" id="{B3FA9D57-880F-49C4-AD0B-A64E30D6F403}"/>
+                </a:ext>
+              </a:extLst>
+            </p:cNvPr>
+            <p:cNvSpPr txBox="1"/>
+            <p:nvPr/>
+          </p:nvSpPr>
+          <p:spPr>
+            <a:xfrm>
+              <a:off x="5682850" y="2920431"/>
+              <a:ext cx="189257" cy="178683"/>
+            </a:xfrm>
+            <a:prstGeom prst="rect">
+              <a:avLst/>
+            </a:prstGeom>
+            <a:noFill/>
+          </p:spPr>
+          <p:txBody>
+            <a:bodyPr wrap="square" lIns="0" tIns="0" rIns="0" bIns="0" rtlCol="0">
+              <a:noAutofit/>
+            </a:bodyPr>
+            <a:lstStyle/>
+            <a:p>
+              <a:pPr algn="ctr"/>
+              <a:r>
+                <a:rPr lang="en-US" sz="1100" dirty="0">
+                  <a:solidFill>
+                    <a:srgbClr val="7030A0"/>
+                  </a:solidFill>
+                </a:rPr>
+                <a:t>*</a:t>
+              </a:r>
+              <a:endParaRPr lang="en-SG" sz="1100" dirty="0">
+                <a:solidFill>
+                  <a:srgbClr val="7030A0"/>
+                </a:solidFill>
+              </a:endParaRPr>
+            </a:p>
+          </p:txBody>
+        </p:sp>
+        <p:sp>
+          <p:nvSpPr>
+            <p:cNvPr id="55" name="Flowchart: Decision 96">
+              <a:extLst>
+                <a:ext uri="{FF2B5EF4-FFF2-40B4-BE49-F238E27FC236}">
+                  <a16:creationId xmlns:a16="http://schemas.microsoft.com/office/drawing/2014/main" id="{B9F96195-942D-4692-91B7-CF34229E7461}"/>
+                </a:ext>
+              </a:extLst>
+            </p:cNvPr>
+            <p:cNvSpPr/>
+            <p:nvPr/>
+          </p:nvSpPr>
+          <p:spPr>
+            <a:xfrm rot="16200000">
+              <a:off x="5521988" y="3154431"/>
+              <a:ext cx="236048" cy="173380"/>
+            </a:xfrm>
+            <a:prstGeom prst="flowChartDecision">
+              <a:avLst/>
+            </a:prstGeom>
+            <a:noFill/>
+            <a:ln w="19050">
+              <a:solidFill>
+                <a:srgbClr val="7030A0"/>
+              </a:solidFill>
+            </a:ln>
+            <a:effectLst/>
+          </p:spPr>
+          <p:style>
+            <a:lnRef idx="1">
+              <a:schemeClr val="accent6"/>
+            </a:lnRef>
+            <a:fillRef idx="2">
+              <a:schemeClr val="accent6"/>
+            </a:fillRef>
+            <a:effectRef idx="1">
+              <a:schemeClr val="accent6"/>
+            </a:effectRef>
+            <a:fontRef idx="minor">
+              <a:schemeClr val="dk1"/>
+            </a:fontRef>
+          </p:style>
+          <p:txBody>
+            <a:bodyPr rtlCol="0" anchor="ctr"/>
+            <a:lstStyle/>
+            <a:p>
+              <a:pPr algn="ctr"/>
+              <a:endParaRPr lang="en-US" sz="1050"/>
+            </a:p>
+          </p:txBody>
+        </p:sp>
+        <p:cxnSp>
+          <p:nvCxnSpPr>
+            <p:cNvPr id="59" name="Elbow Connector 63">
+              <a:extLst>
+                <a:ext uri="{FF2B5EF4-FFF2-40B4-BE49-F238E27FC236}">
+                  <a16:creationId xmlns:a16="http://schemas.microsoft.com/office/drawing/2014/main" id="{E2D6A56C-A223-4236-A1F0-7EFEBA2FC940}"/>
+                </a:ext>
+              </a:extLst>
+            </p:cNvPr>
+            <p:cNvCxnSpPr>
+              <a:cxnSpLocks/>
+              <a:endCxn id="67" idx="1"/>
+            </p:cNvCxnSpPr>
+            <p:nvPr/>
+          </p:nvCxnSpPr>
+          <p:spPr>
+            <a:xfrm flipV="1">
+              <a:off x="4852786" y="2722716"/>
+              <a:ext cx="432916" cy="111294"/>
+            </a:xfrm>
+            <a:prstGeom prst="bentConnector3">
+              <a:avLst/>
+            </a:prstGeom>
+            <a:ln w="19050">
+              <a:solidFill>
+                <a:srgbClr val="7030A0"/>
+              </a:solidFill>
+              <a:headEnd type="none" w="med" len="med"/>
+              <a:tailEnd type="arrow" w="med" len="med"/>
+            </a:ln>
+            <a:effectLst/>
+          </p:spPr>
+          <p:style>
+            <a:lnRef idx="1">
+              <a:schemeClr val="accent2"/>
+            </a:lnRef>
+            <a:fillRef idx="2">
+              <a:schemeClr val="accent2"/>
+            </a:fillRef>
+            <a:effectRef idx="1">
+              <a:schemeClr val="accent2"/>
+            </a:effectRef>
+            <a:fontRef idx="minor">
+              <a:schemeClr val="dk1"/>
+            </a:fontRef>
+          </p:style>
+        </p:cxnSp>
+        <p:sp>
+          <p:nvSpPr>
+            <p:cNvPr id="67" name="Rectangle 8">
+              <a:extLst>
+                <a:ext uri="{FF2B5EF4-FFF2-40B4-BE49-F238E27FC236}">
+                  <a16:creationId xmlns:a16="http://schemas.microsoft.com/office/drawing/2014/main" id="{36D68104-33BB-4C8F-B764-F3F0B25E592B}"/>
+                </a:ext>
+              </a:extLst>
+            </p:cNvPr>
+            <p:cNvSpPr/>
+            <p:nvPr/>
+          </p:nvSpPr>
+          <p:spPr>
+            <a:xfrm>
+              <a:off x="5285702" y="2549336"/>
+              <a:ext cx="708186" cy="346760"/>
+            </a:xfrm>
+            <a:prstGeom prst="rect">
+              <a:avLst/>
+            </a:prstGeom>
+            <a:ln w="19050">
+              <a:solidFill>
+                <a:srgbClr val="7030A0"/>
+              </a:solidFill>
+            </a:ln>
+            <a:effectLst/>
+          </p:spPr>
+          <p:style>
+            <a:lnRef idx="1">
+              <a:schemeClr val="accent4"/>
+            </a:lnRef>
+            <a:fillRef idx="2">
+              <a:schemeClr val="accent4"/>
+            </a:fillRef>
+            <a:effectRef idx="1">
+              <a:schemeClr val="accent4"/>
+            </a:effectRef>
+            <a:fontRef idx="minor">
+              <a:schemeClr val="dk1"/>
+            </a:fontRef>
+          </p:style>
+          <p:txBody>
+            <a:bodyPr rtlCol="0" anchor="ctr"/>
+            <a:lstStyle/>
+            <a:p>
+              <a:pPr algn="ctr"/>
+              <a:r>
+                <a:rPr lang="en-US" sz="1050" dirty="0">
+                  <a:solidFill>
+                    <a:srgbClr val="7030A0"/>
+                  </a:solidFill>
+                </a:rPr>
+                <a:t>Tag</a:t>
+              </a:r>
+              <a:endParaRPr lang="en-SG" sz="1050" dirty="0">
+                <a:solidFill>
+                  <a:srgbClr val="7030A0"/>
+                </a:solidFill>
+              </a:endParaRPr>
+            </a:p>
+          </p:txBody>
+        </p:sp>
+        <p:sp>
+          <p:nvSpPr>
+            <p:cNvPr id="68" name="TextBox 67">
+              <a:extLst>
+                <a:ext uri="{FF2B5EF4-FFF2-40B4-BE49-F238E27FC236}">
+                  <a16:creationId xmlns:a16="http://schemas.microsoft.com/office/drawing/2014/main" id="{18A2ABF0-4DA8-43EE-BACE-A737C4E4CFEC}"/>
+                </a:ext>
+              </a:extLst>
+            </p:cNvPr>
+            <p:cNvSpPr txBox="1"/>
+            <p:nvPr/>
+          </p:nvSpPr>
+          <p:spPr>
+            <a:xfrm>
+              <a:off x="5103762" y="2767724"/>
+              <a:ext cx="189257" cy="178683"/>
+            </a:xfrm>
+            <a:prstGeom prst="rect">
+              <a:avLst/>
+            </a:prstGeom>
+            <a:noFill/>
+          </p:spPr>
+          <p:txBody>
+            <a:bodyPr wrap="square" lIns="0" tIns="0" rIns="0" bIns="0" rtlCol="0">
+              <a:noAutofit/>
+            </a:bodyPr>
+            <a:lstStyle/>
+            <a:p>
+              <a:pPr algn="ctr"/>
+              <a:r>
+                <a:rPr lang="en-US" sz="1100" dirty="0">
+                  <a:solidFill>
+                    <a:srgbClr val="7030A0"/>
+                  </a:solidFill>
+                </a:rPr>
+                <a:t>*</a:t>
+              </a:r>
+              <a:endParaRPr lang="en-SG" sz="1100" dirty="0">
+                <a:solidFill>
+                  <a:srgbClr val="7030A0"/>
+                </a:solidFill>
+              </a:endParaRPr>
+            </a:p>
+          </p:txBody>
+        </p:sp>
+        <p:sp>
+          <p:nvSpPr>
+            <p:cNvPr id="69" name="TextBox 68">
+              <a:extLst>
+                <a:ext uri="{FF2B5EF4-FFF2-40B4-BE49-F238E27FC236}">
+                  <a16:creationId xmlns:a16="http://schemas.microsoft.com/office/drawing/2014/main" id="{8CF9406A-39C7-4163-8880-BB65541FC08E}"/>
+                </a:ext>
+              </a:extLst>
+            </p:cNvPr>
+            <p:cNvSpPr txBox="1"/>
+            <p:nvPr/>
+          </p:nvSpPr>
+          <p:spPr>
+            <a:xfrm>
+              <a:off x="3335606" y="2662682"/>
+              <a:ext cx="189257" cy="178683"/>
+            </a:xfrm>
+            <a:prstGeom prst="rect">
+              <a:avLst/>
+            </a:prstGeom>
+            <a:noFill/>
+          </p:spPr>
+          <p:txBody>
+            <a:bodyPr wrap="square" lIns="0" tIns="0" rIns="0" bIns="0" rtlCol="0">
+              <a:noAutofit/>
+            </a:bodyPr>
+            <a:lstStyle/>
+            <a:p>
+              <a:pPr algn="ctr"/>
+              <a:r>
+                <a:rPr lang="en-US" sz="1100" dirty="0">
+                  <a:solidFill>
+                    <a:srgbClr val="7030A0"/>
+                  </a:solidFill>
+                </a:rPr>
+                <a:t>1</a:t>
+              </a:r>
+              <a:endParaRPr lang="en-SG" sz="1100" dirty="0">
+                <a:solidFill>
+                  <a:srgbClr val="7030A0"/>
+                </a:solidFill>
+              </a:endParaRPr>
+            </a:p>
+          </p:txBody>
+        </p:sp>
+        <p:sp>
+          <p:nvSpPr>
+            <p:cNvPr id="71" name="Flowchart: Decision 96">
+              <a:extLst>
+                <a:ext uri="{FF2B5EF4-FFF2-40B4-BE49-F238E27FC236}">
+                  <a16:creationId xmlns:a16="http://schemas.microsoft.com/office/drawing/2014/main" id="{233007D4-EEA2-4CA6-ACFE-1517B654224E}"/>
+                </a:ext>
+              </a:extLst>
+            </p:cNvPr>
+            <p:cNvSpPr/>
+            <p:nvPr/>
+          </p:nvSpPr>
+          <p:spPr>
+            <a:xfrm>
+              <a:off x="4879835" y="2751791"/>
+              <a:ext cx="236048" cy="173380"/>
+            </a:xfrm>
+            <a:prstGeom prst="flowChartDecision">
+              <a:avLst/>
+            </a:prstGeom>
             <a:solidFill>
               <a:srgbClr val="7030A0"/>
             </a:solidFill>
-          </a:ln>
-          <a:effectLst/>
-        </p:spPr>
-        <p:style>
-          <a:lnRef idx="1">
-            <a:schemeClr val="accent6"/>
-          </a:lnRef>
-          <a:fillRef idx="2">
-            <a:schemeClr val="accent6"/>
-          </a:fillRef>
-          <a:effectRef idx="1">
-            <a:schemeClr val="accent6"/>
-          </a:effectRef>
-          <a:fontRef idx="minor">
-            <a:schemeClr val="dk1"/>
-          </a:fontRef>
-        </p:style>
-        <p:txBody>
-          <a:bodyPr rtlCol="0" anchor="ctr"/>
-          <a:lstStyle/>
-          <a:p>
-            <a:pPr algn="ctr"/>
-            <a:endParaRPr lang="en-US" sz="1050"/>
-          </a:p>
-        </p:txBody>
-      </p:sp>
-      <p:cxnSp>
-        <p:nvCxnSpPr>
-          <p:cNvPr id="30" name="Elbow Connector 29"/>
-          <p:cNvCxnSpPr>
-            <a:stCxn id="51" idx="3"/>
-            <a:endCxn id="49" idx="1"/>
-          </p:cNvCxnSpPr>
-          <p:nvPr/>
-        </p:nvCxnSpPr>
-        <p:spPr>
-          <a:xfrm>
-            <a:off x="3437800" y="3524601"/>
-            <a:ext cx="292915" cy="1923"/>
-          </a:xfrm>
-          <a:prstGeom prst="bentConnector3">
-            <a:avLst/>
-          </a:prstGeom>
-          <a:ln w="19050">
-            <a:solidFill>
-              <a:srgbClr val="7030A0"/>
-            </a:solidFill>
-            <a:headEnd type="none" w="med" len="med"/>
-            <a:tailEnd type="arrow" w="med" len="med"/>
-          </a:ln>
-          <a:effectLst/>
-        </p:spPr>
-        <p:style>
-          <a:lnRef idx="1">
-            <a:schemeClr val="accent2"/>
-          </a:lnRef>
-          <a:fillRef idx="2">
-            <a:schemeClr val="accent2"/>
-          </a:fillRef>
-          <a:effectRef idx="1">
-            <a:schemeClr val="accent2"/>
-          </a:effectRef>
-          <a:fontRef idx="minor">
-            <a:schemeClr val="dk1"/>
-          </a:fontRef>
-        </p:style>
-      </p:cxnSp>
-      <p:sp>
-        <p:nvSpPr>
-          <p:cNvPr id="62" name="Rectangle 8"/>
-          <p:cNvSpPr/>
-          <p:nvPr/>
-        </p:nvSpPr>
-        <p:spPr>
-          <a:xfrm>
-            <a:off x="5282183" y="3347776"/>
-            <a:ext cx="708186" cy="346760"/>
-          </a:xfrm>
-          <a:prstGeom prst="rect">
-            <a:avLst/>
-          </a:prstGeom>
-          <a:ln w="19050">
-            <a:solidFill>
-              <a:srgbClr val="7030A0"/>
-            </a:solidFill>
-          </a:ln>
-          <a:effectLst/>
-        </p:spPr>
-        <p:style>
-          <a:lnRef idx="1">
-            <a:schemeClr val="accent4"/>
-          </a:lnRef>
-          <a:fillRef idx="2">
-            <a:schemeClr val="accent4"/>
-          </a:fillRef>
-          <a:effectRef idx="1">
-            <a:schemeClr val="accent4"/>
-          </a:effectRef>
-          <a:fontRef idx="minor">
-            <a:schemeClr val="dk1"/>
-          </a:fontRef>
-        </p:style>
-        <p:txBody>
-          <a:bodyPr rtlCol="0" anchor="ctr"/>
-          <a:lstStyle/>
-          <a:p>
-            <a:pPr algn="ctr"/>
-            <a:r>
-              <a:rPr lang="en-US" sz="1050" dirty="0">
-                <a:solidFill>
-                  <a:srgbClr val="7030A0"/>
-                </a:solidFill>
-              </a:rPr>
-              <a:t>Person</a:t>
-            </a:r>
-            <a:endParaRPr lang="en-SG" sz="1050" dirty="0">
+            <a:ln w="19050">
               <a:solidFill>
                 <a:srgbClr val="7030A0"/>
               </a:solidFill>
-            </a:endParaRPr>
-          </a:p>
-        </p:txBody>
-      </p:sp>
-      <p:sp>
-        <p:nvSpPr>
-          <p:cNvPr id="63" name="Flowchart: Decision 96"/>
-          <p:cNvSpPr/>
-          <p:nvPr/>
-        </p:nvSpPr>
-        <p:spPr>
-          <a:xfrm>
-            <a:off x="4886966" y="3430775"/>
-            <a:ext cx="236048" cy="173380"/>
-          </a:xfrm>
-          <a:prstGeom prst="flowChartDecision">
-            <a:avLst/>
-          </a:prstGeom>
-          <a:noFill/>
-          <a:ln w="19050">
-            <a:solidFill>
-              <a:srgbClr val="7030A0"/>
-            </a:solidFill>
-          </a:ln>
-          <a:effectLst/>
-        </p:spPr>
-        <p:style>
-          <a:lnRef idx="1">
-            <a:schemeClr val="accent6"/>
-          </a:lnRef>
-          <a:fillRef idx="2">
-            <a:schemeClr val="accent6"/>
-          </a:fillRef>
-          <a:effectRef idx="1">
-            <a:schemeClr val="accent6"/>
-          </a:effectRef>
-          <a:fontRef idx="minor">
-            <a:schemeClr val="dk1"/>
-          </a:fontRef>
-        </p:style>
-        <p:txBody>
-          <a:bodyPr rtlCol="0" anchor="ctr"/>
-          <a:lstStyle/>
-          <a:p>
-            <a:pPr algn="ctr"/>
-            <a:endParaRPr lang="en-US" sz="1050"/>
-          </a:p>
-        </p:txBody>
-      </p:sp>
-      <p:cxnSp>
-        <p:nvCxnSpPr>
-          <p:cNvPr id="64" name="Elbow Connector 63"/>
-          <p:cNvCxnSpPr>
-            <a:cxnSpLocks/>
-            <a:stCxn id="63" idx="3"/>
-            <a:endCxn id="62" idx="1"/>
-          </p:cNvCxnSpPr>
-          <p:nvPr/>
-        </p:nvCxnSpPr>
-        <p:spPr>
-          <a:xfrm>
-            <a:off x="5123014" y="3517465"/>
-            <a:ext cx="159169" cy="3691"/>
-          </a:xfrm>
-          <a:prstGeom prst="bentConnector3">
-            <a:avLst/>
-          </a:prstGeom>
-          <a:ln w="19050">
-            <a:solidFill>
-              <a:srgbClr val="7030A0"/>
-            </a:solidFill>
-            <a:headEnd type="none" w="med" len="med"/>
-            <a:tailEnd type="arrow" w="med" len="med"/>
-          </a:ln>
-          <a:effectLst/>
-        </p:spPr>
-        <p:style>
-          <a:lnRef idx="1">
-            <a:schemeClr val="accent2"/>
-          </a:lnRef>
-          <a:fillRef idx="2">
-            <a:schemeClr val="accent2"/>
-          </a:fillRef>
-          <a:effectRef idx="1">
-            <a:schemeClr val="accent2"/>
-          </a:effectRef>
-          <a:fontRef idx="minor">
-            <a:schemeClr val="dk1"/>
-          </a:fontRef>
-        </p:style>
-      </p:cxnSp>
-      <p:sp>
-        <p:nvSpPr>
-          <p:cNvPr id="76" name="Rectangle 8"/>
-          <p:cNvSpPr/>
-          <p:nvPr/>
-        </p:nvSpPr>
-        <p:spPr>
-          <a:xfrm>
-            <a:off x="6680903" y="3053948"/>
-            <a:ext cx="708186" cy="285783"/>
-          </a:xfrm>
-          <a:prstGeom prst="rect">
-            <a:avLst/>
-          </a:prstGeom>
-          <a:ln w="19050">
-            <a:solidFill>
-              <a:srgbClr val="7030A0"/>
-            </a:solidFill>
-          </a:ln>
-          <a:effectLst/>
-        </p:spPr>
-        <p:style>
-          <a:lnRef idx="1">
-            <a:schemeClr val="accent4"/>
-          </a:lnRef>
-          <a:fillRef idx="2">
-            <a:schemeClr val="accent4"/>
-          </a:fillRef>
-          <a:effectRef idx="1">
-            <a:schemeClr val="accent4"/>
-          </a:effectRef>
-          <a:fontRef idx="minor">
-            <a:schemeClr val="dk1"/>
-          </a:fontRef>
-        </p:style>
-        <p:txBody>
-          <a:bodyPr rtlCol="0" anchor="ctr"/>
-          <a:lstStyle/>
-          <a:p>
-            <a:pPr algn="ctr"/>
-            <a:r>
-              <a:rPr lang="en-US" sz="1050" dirty="0">
-                <a:solidFill>
-                  <a:srgbClr val="7030A0"/>
-                </a:solidFill>
-              </a:rPr>
-              <a:t>Name</a:t>
-            </a:r>
-            <a:endParaRPr lang="en-SG" sz="1050" dirty="0">
+            </a:ln>
+            <a:effectLst/>
+          </p:spPr>
+          <p:style>
+            <a:lnRef idx="1">
+              <a:schemeClr val="accent6"/>
+            </a:lnRef>
+            <a:fillRef idx="2">
+              <a:schemeClr val="accent6"/>
+            </a:fillRef>
+            <a:effectRef idx="1">
+              <a:schemeClr val="accent6"/>
+            </a:effectRef>
+            <a:fontRef idx="minor">
+              <a:schemeClr val="dk1"/>
+            </a:fontRef>
+          </p:style>
+          <p:txBody>
+            <a:bodyPr rtlCol="0" anchor="ctr"/>
+            <a:lstStyle/>
+            <a:p>
+              <a:pPr algn="ctr"/>
+              <a:endParaRPr lang="en-US" sz="1050"/>
+            </a:p>
+          </p:txBody>
+        </p:sp>
+        <p:cxnSp>
+          <p:nvCxnSpPr>
+            <p:cNvPr id="72" name="Elbow Connector 78">
+              <a:extLst>
+                <a:ext uri="{FF2B5EF4-FFF2-40B4-BE49-F238E27FC236}">
+                  <a16:creationId xmlns:a16="http://schemas.microsoft.com/office/drawing/2014/main" id="{D5DFB8C5-B0B0-46C1-967B-4449112ABD6F}"/>
+                </a:ext>
+              </a:extLst>
+            </p:cNvPr>
+            <p:cNvCxnSpPr>
+              <a:cxnSpLocks/>
+              <a:stCxn id="55" idx="3"/>
+              <a:endCxn id="67" idx="2"/>
+            </p:cNvCxnSpPr>
+            <p:nvPr/>
+          </p:nvCxnSpPr>
+          <p:spPr>
+            <a:xfrm rot="16200000" flipV="1">
+              <a:off x="5526404" y="3009488"/>
+              <a:ext cx="227001" cy="217"/>
+            </a:xfrm>
+            <a:prstGeom prst="bentConnector3">
+              <a:avLst>
+                <a:gd name="adj1" fmla="val 50000"/>
+              </a:avLst>
+            </a:prstGeom>
+            <a:ln w="19050">
               <a:solidFill>
                 <a:srgbClr val="7030A0"/>
               </a:solidFill>
-            </a:endParaRPr>
-          </a:p>
-        </p:txBody>
-      </p:sp>
-      <p:sp>
-        <p:nvSpPr>
-          <p:cNvPr id="78" name="Flowchart: Decision 96"/>
-          <p:cNvSpPr/>
-          <p:nvPr/>
-        </p:nvSpPr>
-        <p:spPr>
-          <a:xfrm>
-            <a:off x="6010453" y="3437911"/>
-            <a:ext cx="236048" cy="173380"/>
-          </a:xfrm>
-          <a:prstGeom prst="flowChartDecision">
-            <a:avLst/>
-          </a:prstGeom>
-          <a:solidFill>
-            <a:srgbClr val="7030A0"/>
-          </a:solidFill>
-          <a:ln w="19050">
-            <a:solidFill>
-              <a:srgbClr val="7030A0"/>
-            </a:solidFill>
-          </a:ln>
-          <a:effectLst/>
-        </p:spPr>
-        <p:style>
-          <a:lnRef idx="1">
-            <a:schemeClr val="accent6"/>
-          </a:lnRef>
-          <a:fillRef idx="2">
-            <a:schemeClr val="accent6"/>
-          </a:fillRef>
-          <a:effectRef idx="1">
-            <a:schemeClr val="accent6"/>
-          </a:effectRef>
-          <a:fontRef idx="minor">
-            <a:schemeClr val="dk1"/>
-          </a:fontRef>
-        </p:style>
-        <p:txBody>
-          <a:bodyPr rtlCol="0" anchor="ctr"/>
-          <a:lstStyle/>
-          <a:p>
-            <a:pPr algn="ctr"/>
-            <a:endParaRPr lang="en-US" sz="1050"/>
-          </a:p>
-        </p:txBody>
-      </p:sp>
-      <p:cxnSp>
-        <p:nvCxnSpPr>
-          <p:cNvPr id="79" name="Elbow Connector 78"/>
-          <p:cNvCxnSpPr>
-            <a:cxnSpLocks/>
-          </p:cNvCxnSpPr>
-          <p:nvPr/>
-        </p:nvCxnSpPr>
-        <p:spPr>
-          <a:xfrm flipV="1">
-            <a:off x="6246501" y="3196531"/>
-            <a:ext cx="434402" cy="327761"/>
-          </a:xfrm>
-          <a:prstGeom prst="bentConnector3">
-            <a:avLst/>
-          </a:prstGeom>
-          <a:ln w="19050">
-            <a:solidFill>
-              <a:srgbClr val="7030A0"/>
-            </a:solidFill>
-            <a:headEnd type="none" w="med" len="med"/>
-            <a:tailEnd type="arrow" w="med" len="med"/>
-          </a:ln>
-          <a:effectLst/>
-        </p:spPr>
-        <p:style>
-          <a:lnRef idx="1">
-            <a:schemeClr val="accent2"/>
-          </a:lnRef>
-          <a:fillRef idx="2">
-            <a:schemeClr val="accent2"/>
-          </a:fillRef>
-          <a:effectRef idx="1">
-            <a:schemeClr val="accent2"/>
-          </a:effectRef>
-          <a:fontRef idx="minor">
-            <a:schemeClr val="dk1"/>
-          </a:fontRef>
-        </p:style>
-      </p:cxnSp>
-      <p:sp>
-        <p:nvSpPr>
-          <p:cNvPr id="80" name="Rectangle 8"/>
-          <p:cNvSpPr/>
-          <p:nvPr/>
-        </p:nvSpPr>
-        <p:spPr>
-          <a:xfrm>
-            <a:off x="6680903" y="3376926"/>
-            <a:ext cx="708186" cy="285783"/>
-          </a:xfrm>
-          <a:prstGeom prst="rect">
-            <a:avLst/>
-          </a:prstGeom>
-          <a:ln w="19050">
-            <a:solidFill>
-              <a:srgbClr val="7030A0"/>
-            </a:solidFill>
-          </a:ln>
-          <a:effectLst/>
-        </p:spPr>
-        <p:style>
-          <a:lnRef idx="1">
-            <a:schemeClr val="accent4"/>
-          </a:lnRef>
-          <a:fillRef idx="2">
-            <a:schemeClr val="accent4"/>
-          </a:fillRef>
-          <a:effectRef idx="1">
-            <a:schemeClr val="accent4"/>
-          </a:effectRef>
-          <a:fontRef idx="minor">
-            <a:schemeClr val="dk1"/>
-          </a:fontRef>
-        </p:style>
-        <p:txBody>
-          <a:bodyPr rtlCol="0" anchor="ctr"/>
-          <a:lstStyle/>
-          <a:p>
-            <a:pPr algn="ctr"/>
-            <a:r>
-              <a:rPr lang="en-US" sz="1050" dirty="0">
-                <a:solidFill>
-                  <a:srgbClr val="7030A0"/>
-                </a:solidFill>
-              </a:rPr>
-              <a:t>Phone</a:t>
-            </a:r>
-            <a:endParaRPr lang="en-SG" sz="1050" dirty="0">
-              <a:solidFill>
-                <a:srgbClr val="7030A0"/>
-              </a:solidFill>
-            </a:endParaRPr>
-          </a:p>
-        </p:txBody>
-      </p:sp>
-      <p:cxnSp>
-        <p:nvCxnSpPr>
-          <p:cNvPr id="81" name="Elbow Connector 80"/>
-          <p:cNvCxnSpPr>
-            <a:stCxn id="78" idx="3"/>
-            <a:endCxn id="80" idx="1"/>
-          </p:cNvCxnSpPr>
-          <p:nvPr/>
-        </p:nvCxnSpPr>
-        <p:spPr>
-          <a:xfrm flipV="1">
-            <a:off x="6246501" y="3519818"/>
-            <a:ext cx="434402" cy="4783"/>
-          </a:xfrm>
-          <a:prstGeom prst="bentConnector3">
-            <a:avLst/>
-          </a:prstGeom>
-          <a:ln w="19050">
-            <a:solidFill>
-              <a:srgbClr val="7030A0"/>
-            </a:solidFill>
-            <a:headEnd type="none" w="med" len="med"/>
-            <a:tailEnd type="arrow" w="med" len="med"/>
-          </a:ln>
-          <a:effectLst/>
-        </p:spPr>
-        <p:style>
-          <a:lnRef idx="1">
-            <a:schemeClr val="accent2"/>
-          </a:lnRef>
-          <a:fillRef idx="2">
-            <a:schemeClr val="accent2"/>
-          </a:fillRef>
-          <a:effectRef idx="1">
-            <a:schemeClr val="accent2"/>
-          </a:effectRef>
-          <a:fontRef idx="minor">
-            <a:schemeClr val="dk1"/>
-          </a:fontRef>
-        </p:style>
-      </p:cxnSp>
-      <p:sp>
-        <p:nvSpPr>
-          <p:cNvPr id="83" name="Rectangle 8"/>
-          <p:cNvSpPr/>
-          <p:nvPr/>
-        </p:nvSpPr>
-        <p:spPr>
-          <a:xfrm>
-            <a:off x="6680903" y="3699904"/>
-            <a:ext cx="708186" cy="285783"/>
-          </a:xfrm>
-          <a:prstGeom prst="rect">
-            <a:avLst/>
-          </a:prstGeom>
-          <a:ln w="19050">
-            <a:solidFill>
-              <a:srgbClr val="7030A0"/>
-            </a:solidFill>
-          </a:ln>
-          <a:effectLst/>
-        </p:spPr>
-        <p:style>
-          <a:lnRef idx="1">
-            <a:schemeClr val="accent4"/>
-          </a:lnRef>
-          <a:fillRef idx="2">
-            <a:schemeClr val="accent4"/>
-          </a:fillRef>
-          <a:effectRef idx="1">
-            <a:schemeClr val="accent4"/>
-          </a:effectRef>
-          <a:fontRef idx="minor">
-            <a:schemeClr val="dk1"/>
-          </a:fontRef>
-        </p:style>
-        <p:txBody>
-          <a:bodyPr rtlCol="0" anchor="ctr"/>
-          <a:lstStyle/>
-          <a:p>
-            <a:pPr algn="ctr"/>
-            <a:r>
-              <a:rPr lang="en-US" sz="1050" dirty="0">
-                <a:solidFill>
-                  <a:srgbClr val="7030A0"/>
-                </a:solidFill>
-              </a:rPr>
-              <a:t>Email</a:t>
-            </a:r>
-            <a:endParaRPr lang="en-SG" sz="1050" dirty="0">
-              <a:solidFill>
-                <a:srgbClr val="7030A0"/>
-              </a:solidFill>
-            </a:endParaRPr>
-          </a:p>
-        </p:txBody>
-      </p:sp>
-      <p:cxnSp>
-        <p:nvCxnSpPr>
-          <p:cNvPr id="84" name="Elbow Connector 83"/>
-          <p:cNvCxnSpPr>
-            <a:stCxn id="78" idx="3"/>
-            <a:endCxn id="83" idx="1"/>
-          </p:cNvCxnSpPr>
-          <p:nvPr/>
-        </p:nvCxnSpPr>
-        <p:spPr>
-          <a:xfrm>
-            <a:off x="6246501" y="3524601"/>
-            <a:ext cx="434402" cy="318195"/>
-          </a:xfrm>
-          <a:prstGeom prst="bentConnector3">
-            <a:avLst/>
-          </a:prstGeom>
-          <a:ln w="19050">
-            <a:solidFill>
-              <a:srgbClr val="7030A0"/>
-            </a:solidFill>
-            <a:headEnd type="none" w="med" len="med"/>
-            <a:tailEnd type="arrow" w="med" len="med"/>
-          </a:ln>
-          <a:effectLst/>
-        </p:spPr>
-        <p:style>
-          <a:lnRef idx="1">
-            <a:schemeClr val="accent2"/>
-          </a:lnRef>
-          <a:fillRef idx="2">
-            <a:schemeClr val="accent2"/>
-          </a:fillRef>
-          <a:effectRef idx="1">
-            <a:schemeClr val="accent2"/>
-          </a:effectRef>
-          <a:fontRef idx="minor">
-            <a:schemeClr val="dk1"/>
-          </a:fontRef>
-        </p:style>
-      </p:cxnSp>
-      <p:sp>
-        <p:nvSpPr>
-          <p:cNvPr id="85" name="Rectangle 8"/>
-          <p:cNvSpPr/>
-          <p:nvPr/>
-        </p:nvSpPr>
-        <p:spPr>
-          <a:xfrm>
-            <a:off x="6680903" y="4022881"/>
-            <a:ext cx="708186" cy="285783"/>
-          </a:xfrm>
-          <a:prstGeom prst="rect">
-            <a:avLst/>
-          </a:prstGeom>
-          <a:ln w="19050">
-            <a:solidFill>
-              <a:srgbClr val="7030A0"/>
-            </a:solidFill>
-          </a:ln>
-          <a:effectLst/>
-        </p:spPr>
-        <p:style>
-          <a:lnRef idx="1">
-            <a:schemeClr val="accent4"/>
-          </a:lnRef>
-          <a:fillRef idx="2">
-            <a:schemeClr val="accent4"/>
-          </a:fillRef>
-          <a:effectRef idx="1">
-            <a:schemeClr val="accent4"/>
-          </a:effectRef>
-          <a:fontRef idx="minor">
-            <a:schemeClr val="dk1"/>
-          </a:fontRef>
-        </p:style>
-        <p:txBody>
-          <a:bodyPr rtlCol="0" anchor="ctr"/>
-          <a:lstStyle/>
-          <a:p>
-            <a:pPr algn="ctr"/>
-            <a:r>
-              <a:rPr lang="en-US" sz="1050" dirty="0">
-                <a:solidFill>
-                  <a:srgbClr val="7030A0"/>
-                </a:solidFill>
-              </a:rPr>
-              <a:t>Address</a:t>
-            </a:r>
-            <a:endParaRPr lang="en-SG" sz="1050" dirty="0">
-              <a:solidFill>
-                <a:srgbClr val="7030A0"/>
-              </a:solidFill>
-            </a:endParaRPr>
-          </a:p>
-        </p:txBody>
-      </p:sp>
-      <p:cxnSp>
-        <p:nvCxnSpPr>
-          <p:cNvPr id="86" name="Elbow Connector 85"/>
-          <p:cNvCxnSpPr>
-            <a:cxnSpLocks/>
-            <a:stCxn id="78" idx="3"/>
-            <a:endCxn id="85" idx="1"/>
-          </p:cNvCxnSpPr>
-          <p:nvPr/>
-        </p:nvCxnSpPr>
-        <p:spPr>
-          <a:xfrm>
-            <a:off x="6246501" y="3524601"/>
-            <a:ext cx="434402" cy="641172"/>
-          </a:xfrm>
-          <a:prstGeom prst="bentConnector3">
-            <a:avLst/>
-          </a:prstGeom>
-          <a:ln w="19050">
-            <a:solidFill>
-              <a:srgbClr val="7030A0"/>
-            </a:solidFill>
-            <a:headEnd type="none" w="med" len="med"/>
-            <a:tailEnd type="arrow" w="med" len="med"/>
-          </a:ln>
-          <a:effectLst/>
-        </p:spPr>
-        <p:style>
-          <a:lnRef idx="1">
-            <a:schemeClr val="accent2"/>
-          </a:lnRef>
-          <a:fillRef idx="2">
-            <a:schemeClr val="accent2"/>
-          </a:fillRef>
-          <a:effectRef idx="1">
-            <a:schemeClr val="accent2"/>
-          </a:effectRef>
-          <a:fontRef idx="minor">
-            <a:schemeClr val="dk1"/>
-          </a:fontRef>
-        </p:style>
-      </p:cxnSp>
-      <p:sp>
-        <p:nvSpPr>
-          <p:cNvPr id="54" name="TextBox 53"/>
-          <p:cNvSpPr txBox="1"/>
-          <p:nvPr/>
-        </p:nvSpPr>
-        <p:spPr>
-          <a:xfrm>
-            <a:off x="3293478" y="3548574"/>
-            <a:ext cx="189257" cy="178683"/>
-          </a:xfrm>
-          <a:prstGeom prst="rect">
-            <a:avLst/>
-          </a:prstGeom>
-          <a:noFill/>
-        </p:spPr>
-        <p:txBody>
-          <a:bodyPr wrap="square" lIns="0" tIns="0" rIns="0" bIns="0" rtlCol="0">
-            <a:noAutofit/>
-          </a:bodyPr>
-          <a:lstStyle/>
-          <a:p>
-            <a:pPr algn="ctr"/>
-            <a:r>
-              <a:rPr lang="en-US" sz="1100" dirty="0">
-                <a:solidFill>
-                  <a:srgbClr val="7030A0"/>
-                </a:solidFill>
-              </a:rPr>
-              <a:t>1</a:t>
-            </a:r>
-            <a:endParaRPr lang="en-SG" sz="1100" dirty="0">
-              <a:solidFill>
-                <a:srgbClr val="7030A0"/>
-              </a:solidFill>
-            </a:endParaRPr>
-          </a:p>
-        </p:txBody>
-      </p:sp>
-      <p:sp>
-        <p:nvSpPr>
-          <p:cNvPr id="61" name="TextBox 60"/>
-          <p:cNvSpPr txBox="1"/>
-          <p:nvPr/>
-        </p:nvSpPr>
-        <p:spPr>
-          <a:xfrm>
-            <a:off x="5103762" y="3587627"/>
-            <a:ext cx="189257" cy="178683"/>
-          </a:xfrm>
-          <a:prstGeom prst="rect">
-            <a:avLst/>
-          </a:prstGeom>
-          <a:noFill/>
-        </p:spPr>
-        <p:txBody>
-          <a:bodyPr wrap="square" lIns="0" tIns="0" rIns="0" bIns="0" rtlCol="0">
-            <a:noAutofit/>
-          </a:bodyPr>
-          <a:lstStyle/>
-          <a:p>
-            <a:pPr algn="ctr"/>
-            <a:r>
-              <a:rPr lang="en-US" sz="1100" dirty="0">
-                <a:solidFill>
-                  <a:srgbClr val="7030A0"/>
-                </a:solidFill>
-              </a:rPr>
-              <a:t>*</a:t>
-            </a:r>
-            <a:endParaRPr lang="en-SG" sz="1100" dirty="0">
-              <a:solidFill>
-                <a:srgbClr val="7030A0"/>
-              </a:solidFill>
-            </a:endParaRPr>
-          </a:p>
-        </p:txBody>
-      </p:sp>
-      <p:sp>
-        <p:nvSpPr>
-          <p:cNvPr id="52" name="Rectangle 8">
-            <a:extLst>
-              <a:ext uri="{FF2B5EF4-FFF2-40B4-BE49-F238E27FC236}">
-                <a16:creationId xmlns:a16="http://schemas.microsoft.com/office/drawing/2014/main" id="{ABDCDBD2-131A-4B66-A2F2-43BBEE82C773}"/>
-              </a:ext>
-            </a:extLst>
-          </p:cNvPr>
-          <p:cNvSpPr/>
-          <p:nvPr/>
-        </p:nvSpPr>
-        <p:spPr>
-          <a:xfrm>
-            <a:off x="3724378" y="2696571"/>
-            <a:ext cx="1156969" cy="285783"/>
-          </a:xfrm>
-          <a:prstGeom prst="rect">
-            <a:avLst/>
-          </a:prstGeom>
-          <a:ln w="19050">
-            <a:solidFill>
-              <a:srgbClr val="7030A0"/>
-            </a:solidFill>
-          </a:ln>
-          <a:effectLst/>
-        </p:spPr>
-        <p:style>
-          <a:lnRef idx="1">
-            <a:schemeClr val="accent4"/>
-          </a:lnRef>
-          <a:fillRef idx="2">
-            <a:schemeClr val="accent4"/>
-          </a:fillRef>
-          <a:effectRef idx="1">
-            <a:schemeClr val="accent4"/>
-          </a:effectRef>
-          <a:fontRef idx="minor">
-            <a:schemeClr val="dk1"/>
-          </a:fontRef>
-        </p:style>
-        <p:txBody>
-          <a:bodyPr rtlCol="0" anchor="ctr"/>
-          <a:lstStyle/>
-          <a:p>
-            <a:pPr algn="ctr"/>
-            <a:r>
-              <a:rPr lang="en-US" sz="1050" dirty="0" err="1">
-                <a:solidFill>
-                  <a:srgbClr val="7030A0"/>
-                </a:solidFill>
-              </a:rPr>
-              <a:t>UniqueTagList</a:t>
-            </a:r>
-            <a:endParaRPr lang="en-SG" sz="1050" dirty="0">
-              <a:solidFill>
-                <a:srgbClr val="7030A0"/>
-              </a:solidFill>
-            </a:endParaRPr>
-          </a:p>
-        </p:txBody>
-      </p:sp>
-      <p:cxnSp>
-        <p:nvCxnSpPr>
-          <p:cNvPr id="53" name="Elbow Connector 78">
-            <a:extLst>
-              <a:ext uri="{FF2B5EF4-FFF2-40B4-BE49-F238E27FC236}">
-                <a16:creationId xmlns:a16="http://schemas.microsoft.com/office/drawing/2014/main" id="{B97967F8-618A-448B-81FD-CDFD4AF0EC64}"/>
-              </a:ext>
-            </a:extLst>
-          </p:cNvPr>
-          <p:cNvCxnSpPr>
-            <a:cxnSpLocks/>
-            <a:stCxn id="54" idx="0"/>
-            <a:endCxn id="52" idx="1"/>
-          </p:cNvCxnSpPr>
-          <p:nvPr/>
-        </p:nvCxnSpPr>
-        <p:spPr>
-          <a:xfrm rot="5400000" flipH="1" flipV="1">
-            <a:off x="3201687" y="3025884"/>
-            <a:ext cx="709111" cy="336271"/>
-          </a:xfrm>
-          <a:prstGeom prst="bentConnector2">
-            <a:avLst/>
-          </a:prstGeom>
-          <a:ln w="19050">
-            <a:solidFill>
-              <a:srgbClr val="7030A0"/>
-            </a:solidFill>
-            <a:headEnd type="none" w="med" len="med"/>
-            <a:tailEnd type="arrow" w="med" len="med"/>
-          </a:ln>
-          <a:effectLst/>
-        </p:spPr>
-        <p:style>
-          <a:lnRef idx="1">
-            <a:schemeClr val="accent2"/>
-          </a:lnRef>
-          <a:fillRef idx="2">
-            <a:schemeClr val="accent2"/>
-          </a:fillRef>
-          <a:effectRef idx="1">
-            <a:schemeClr val="accent2"/>
-          </a:effectRef>
-          <a:fontRef idx="minor">
-            <a:schemeClr val="dk1"/>
-          </a:fontRef>
-        </p:style>
-      </p:cxnSp>
-      <p:sp>
-        <p:nvSpPr>
-          <p:cNvPr id="50" name="TextBox 49">
-            <a:extLst>
-              <a:ext uri="{FF2B5EF4-FFF2-40B4-BE49-F238E27FC236}">
-                <a16:creationId xmlns:a16="http://schemas.microsoft.com/office/drawing/2014/main" id="{B3FA9D57-880F-49C4-AD0B-A64E30D6F403}"/>
-              </a:ext>
-            </a:extLst>
-          </p:cNvPr>
-          <p:cNvSpPr txBox="1"/>
-          <p:nvPr/>
-        </p:nvSpPr>
-        <p:spPr>
-          <a:xfrm>
-            <a:off x="5682850" y="2920431"/>
-            <a:ext cx="189257" cy="178683"/>
-          </a:xfrm>
-          <a:prstGeom prst="rect">
-            <a:avLst/>
-          </a:prstGeom>
-          <a:noFill/>
-        </p:spPr>
-        <p:txBody>
-          <a:bodyPr wrap="square" lIns="0" tIns="0" rIns="0" bIns="0" rtlCol="0">
-            <a:noAutofit/>
-          </a:bodyPr>
-          <a:lstStyle/>
-          <a:p>
-            <a:pPr algn="ctr"/>
-            <a:r>
-              <a:rPr lang="en-US" sz="1100" dirty="0">
-                <a:solidFill>
-                  <a:srgbClr val="7030A0"/>
-                </a:solidFill>
-              </a:rPr>
-              <a:t>*</a:t>
-            </a:r>
-            <a:endParaRPr lang="en-SG" sz="1100" dirty="0">
-              <a:solidFill>
-                <a:srgbClr val="7030A0"/>
-              </a:solidFill>
-            </a:endParaRPr>
-          </a:p>
-        </p:txBody>
-      </p:sp>
-      <p:sp>
-        <p:nvSpPr>
-          <p:cNvPr id="55" name="Flowchart: Decision 96">
-            <a:extLst>
-              <a:ext uri="{FF2B5EF4-FFF2-40B4-BE49-F238E27FC236}">
-                <a16:creationId xmlns:a16="http://schemas.microsoft.com/office/drawing/2014/main" id="{B9F96195-942D-4692-91B7-CF34229E7461}"/>
-              </a:ext>
-            </a:extLst>
-          </p:cNvPr>
-          <p:cNvSpPr/>
-          <p:nvPr/>
-        </p:nvSpPr>
-        <p:spPr>
-          <a:xfrm rot="16200000">
-            <a:off x="5521988" y="3154431"/>
-            <a:ext cx="236048" cy="173380"/>
-          </a:xfrm>
-          <a:prstGeom prst="flowChartDecision">
-            <a:avLst/>
-          </a:prstGeom>
-          <a:noFill/>
-          <a:ln w="19050">
-            <a:solidFill>
-              <a:srgbClr val="7030A0"/>
-            </a:solidFill>
-          </a:ln>
-          <a:effectLst/>
-        </p:spPr>
-        <p:style>
-          <a:lnRef idx="1">
-            <a:schemeClr val="accent6"/>
-          </a:lnRef>
-          <a:fillRef idx="2">
-            <a:schemeClr val="accent6"/>
-          </a:fillRef>
-          <a:effectRef idx="1">
-            <a:schemeClr val="accent6"/>
-          </a:effectRef>
-          <a:fontRef idx="minor">
-            <a:schemeClr val="dk1"/>
-          </a:fontRef>
-        </p:style>
-        <p:txBody>
-          <a:bodyPr rtlCol="0" anchor="ctr"/>
-          <a:lstStyle/>
-          <a:p>
-            <a:pPr algn="ctr"/>
-            <a:endParaRPr lang="en-US" sz="1050"/>
-          </a:p>
-        </p:txBody>
-      </p:sp>
-      <p:cxnSp>
-        <p:nvCxnSpPr>
-          <p:cNvPr id="59" name="Elbow Connector 63">
-            <a:extLst>
-              <a:ext uri="{FF2B5EF4-FFF2-40B4-BE49-F238E27FC236}">
-                <a16:creationId xmlns:a16="http://schemas.microsoft.com/office/drawing/2014/main" id="{E2D6A56C-A223-4236-A1F0-7EFEBA2FC940}"/>
-              </a:ext>
-            </a:extLst>
-          </p:cNvPr>
-          <p:cNvCxnSpPr>
-            <a:cxnSpLocks/>
-            <a:endCxn id="67" idx="1"/>
-          </p:cNvCxnSpPr>
-          <p:nvPr/>
-        </p:nvCxnSpPr>
-        <p:spPr>
-          <a:xfrm flipV="1">
-            <a:off x="4852786" y="2722716"/>
-            <a:ext cx="432916" cy="111294"/>
-          </a:xfrm>
-          <a:prstGeom prst="bentConnector3">
-            <a:avLst/>
-          </a:prstGeom>
-          <a:ln w="19050">
-            <a:solidFill>
-              <a:srgbClr val="7030A0"/>
-            </a:solidFill>
-            <a:headEnd type="none" w="med" len="med"/>
-            <a:tailEnd type="arrow" w="med" len="med"/>
-          </a:ln>
-          <a:effectLst/>
-        </p:spPr>
-        <p:style>
-          <a:lnRef idx="1">
-            <a:schemeClr val="accent2"/>
-          </a:lnRef>
-          <a:fillRef idx="2">
-            <a:schemeClr val="accent2"/>
-          </a:fillRef>
-          <a:effectRef idx="1">
-            <a:schemeClr val="accent2"/>
-          </a:effectRef>
-          <a:fontRef idx="minor">
-            <a:schemeClr val="dk1"/>
-          </a:fontRef>
-        </p:style>
-      </p:cxnSp>
-      <p:sp>
-        <p:nvSpPr>
-          <p:cNvPr id="67" name="Rectangle 8">
-            <a:extLst>
-              <a:ext uri="{FF2B5EF4-FFF2-40B4-BE49-F238E27FC236}">
-                <a16:creationId xmlns:a16="http://schemas.microsoft.com/office/drawing/2014/main" id="{36D68104-33BB-4C8F-B764-F3F0B25E592B}"/>
-              </a:ext>
-            </a:extLst>
-          </p:cNvPr>
-          <p:cNvSpPr/>
-          <p:nvPr/>
-        </p:nvSpPr>
-        <p:spPr>
-          <a:xfrm>
-            <a:off x="5285702" y="2549336"/>
-            <a:ext cx="708186" cy="346760"/>
-          </a:xfrm>
-          <a:prstGeom prst="rect">
-            <a:avLst/>
-          </a:prstGeom>
-          <a:ln w="19050">
-            <a:solidFill>
-              <a:srgbClr val="7030A0"/>
-            </a:solidFill>
-          </a:ln>
-          <a:effectLst/>
-        </p:spPr>
-        <p:style>
-          <a:lnRef idx="1">
-            <a:schemeClr val="accent4"/>
-          </a:lnRef>
-          <a:fillRef idx="2">
-            <a:schemeClr val="accent4"/>
-          </a:fillRef>
-          <a:effectRef idx="1">
-            <a:schemeClr val="accent4"/>
-          </a:effectRef>
-          <a:fontRef idx="minor">
-            <a:schemeClr val="dk1"/>
-          </a:fontRef>
-        </p:style>
-        <p:txBody>
-          <a:bodyPr rtlCol="0" anchor="ctr"/>
-          <a:lstStyle/>
-          <a:p>
-            <a:pPr algn="ctr"/>
-            <a:r>
-              <a:rPr lang="en-US" sz="1050" dirty="0">
-                <a:solidFill>
-                  <a:srgbClr val="7030A0"/>
-                </a:solidFill>
-              </a:rPr>
-              <a:t>Tag</a:t>
-            </a:r>
-            <a:endParaRPr lang="en-SG" sz="1050" dirty="0">
-              <a:solidFill>
-                <a:srgbClr val="7030A0"/>
-              </a:solidFill>
-            </a:endParaRPr>
-          </a:p>
-        </p:txBody>
-      </p:sp>
-      <p:sp>
-        <p:nvSpPr>
-          <p:cNvPr id="68" name="TextBox 67">
-            <a:extLst>
-              <a:ext uri="{FF2B5EF4-FFF2-40B4-BE49-F238E27FC236}">
-                <a16:creationId xmlns:a16="http://schemas.microsoft.com/office/drawing/2014/main" id="{18A2ABF0-4DA8-43EE-BACE-A737C4E4CFEC}"/>
-              </a:ext>
-            </a:extLst>
-          </p:cNvPr>
-          <p:cNvSpPr txBox="1"/>
-          <p:nvPr/>
-        </p:nvSpPr>
-        <p:spPr>
-          <a:xfrm>
-            <a:off x="5103762" y="2767724"/>
-            <a:ext cx="189257" cy="178683"/>
-          </a:xfrm>
-          <a:prstGeom prst="rect">
-            <a:avLst/>
-          </a:prstGeom>
-          <a:noFill/>
-        </p:spPr>
-        <p:txBody>
-          <a:bodyPr wrap="square" lIns="0" tIns="0" rIns="0" bIns="0" rtlCol="0">
-            <a:noAutofit/>
-          </a:bodyPr>
-          <a:lstStyle/>
-          <a:p>
-            <a:pPr algn="ctr"/>
-            <a:r>
-              <a:rPr lang="en-US" sz="1100" dirty="0">
-                <a:solidFill>
-                  <a:srgbClr val="7030A0"/>
-                </a:solidFill>
-              </a:rPr>
-              <a:t>*</a:t>
-            </a:r>
-            <a:endParaRPr lang="en-SG" sz="1100" dirty="0">
-              <a:solidFill>
-                <a:srgbClr val="7030A0"/>
-              </a:solidFill>
-            </a:endParaRPr>
-          </a:p>
-        </p:txBody>
-      </p:sp>
-      <p:sp>
-        <p:nvSpPr>
-          <p:cNvPr id="69" name="TextBox 68">
-            <a:extLst>
-              <a:ext uri="{FF2B5EF4-FFF2-40B4-BE49-F238E27FC236}">
-                <a16:creationId xmlns:a16="http://schemas.microsoft.com/office/drawing/2014/main" id="{8CF9406A-39C7-4163-8880-BB65541FC08E}"/>
-              </a:ext>
-            </a:extLst>
-          </p:cNvPr>
-          <p:cNvSpPr txBox="1"/>
-          <p:nvPr/>
-        </p:nvSpPr>
-        <p:spPr>
-          <a:xfrm>
-            <a:off x="3335606" y="2662682"/>
-            <a:ext cx="189257" cy="178683"/>
-          </a:xfrm>
-          <a:prstGeom prst="rect">
-            <a:avLst/>
-          </a:prstGeom>
-          <a:noFill/>
-        </p:spPr>
-        <p:txBody>
-          <a:bodyPr wrap="square" lIns="0" tIns="0" rIns="0" bIns="0" rtlCol="0">
-            <a:noAutofit/>
-          </a:bodyPr>
-          <a:lstStyle/>
-          <a:p>
-            <a:pPr algn="ctr"/>
-            <a:r>
-              <a:rPr lang="en-US" sz="1100" dirty="0">
-                <a:solidFill>
-                  <a:srgbClr val="7030A0"/>
-                </a:solidFill>
-              </a:rPr>
-              <a:t>1</a:t>
-            </a:r>
-            <a:endParaRPr lang="en-SG" sz="1100" dirty="0">
-              <a:solidFill>
-                <a:srgbClr val="7030A0"/>
-              </a:solidFill>
-            </a:endParaRPr>
-          </a:p>
-        </p:txBody>
-      </p:sp>
-      <p:sp>
-        <p:nvSpPr>
-          <p:cNvPr id="71" name="Flowchart: Decision 96">
-            <a:extLst>
-              <a:ext uri="{FF2B5EF4-FFF2-40B4-BE49-F238E27FC236}">
-                <a16:creationId xmlns:a16="http://schemas.microsoft.com/office/drawing/2014/main" id="{233007D4-EEA2-4CA6-ACFE-1517B654224E}"/>
-              </a:ext>
-            </a:extLst>
-          </p:cNvPr>
-          <p:cNvSpPr/>
-          <p:nvPr/>
-        </p:nvSpPr>
-        <p:spPr>
-          <a:xfrm>
-            <a:off x="4879835" y="2751791"/>
-            <a:ext cx="236048" cy="173380"/>
-          </a:xfrm>
-          <a:prstGeom prst="flowChartDecision">
-            <a:avLst/>
-          </a:prstGeom>
-          <a:solidFill>
-            <a:srgbClr val="7030A0"/>
-          </a:solidFill>
-          <a:ln w="19050">
-            <a:solidFill>
-              <a:srgbClr val="7030A0"/>
-            </a:solidFill>
-          </a:ln>
-          <a:effectLst/>
-        </p:spPr>
-        <p:style>
-          <a:lnRef idx="1">
-            <a:schemeClr val="accent6"/>
-          </a:lnRef>
-          <a:fillRef idx="2">
-            <a:schemeClr val="accent6"/>
-          </a:fillRef>
-          <a:effectRef idx="1">
-            <a:schemeClr val="accent6"/>
-          </a:effectRef>
-          <a:fontRef idx="minor">
-            <a:schemeClr val="dk1"/>
-          </a:fontRef>
-        </p:style>
-        <p:txBody>
-          <a:bodyPr rtlCol="0" anchor="ctr"/>
-          <a:lstStyle/>
-          <a:p>
-            <a:pPr algn="ctr"/>
-            <a:endParaRPr lang="en-US" sz="1050"/>
-          </a:p>
-        </p:txBody>
-      </p:sp>
-      <p:cxnSp>
-        <p:nvCxnSpPr>
-          <p:cNvPr id="72" name="Elbow Connector 78">
-            <a:extLst>
-              <a:ext uri="{FF2B5EF4-FFF2-40B4-BE49-F238E27FC236}">
-                <a16:creationId xmlns:a16="http://schemas.microsoft.com/office/drawing/2014/main" id="{D5DFB8C5-B0B0-46C1-967B-4449112ABD6F}"/>
-              </a:ext>
-            </a:extLst>
-          </p:cNvPr>
-          <p:cNvCxnSpPr>
-            <a:cxnSpLocks/>
-            <a:stCxn id="55" idx="3"/>
-            <a:endCxn id="67" idx="2"/>
-          </p:cNvCxnSpPr>
-          <p:nvPr/>
-        </p:nvCxnSpPr>
-        <p:spPr>
-          <a:xfrm rot="16200000" flipV="1">
-            <a:off x="5526404" y="3009488"/>
-            <a:ext cx="227001" cy="217"/>
-          </a:xfrm>
-          <a:prstGeom prst="bentConnector3">
-            <a:avLst>
-              <a:gd name="adj1" fmla="val 50000"/>
-            </a:avLst>
-          </a:prstGeom>
-          <a:ln w="19050">
-            <a:solidFill>
-              <a:srgbClr val="7030A0"/>
-            </a:solidFill>
-            <a:headEnd type="none" w="med" len="med"/>
-            <a:tailEnd type="arrow" w="med" len="med"/>
-          </a:ln>
-          <a:effectLst/>
-        </p:spPr>
-        <p:style>
-          <a:lnRef idx="1">
-            <a:schemeClr val="accent2"/>
-          </a:lnRef>
-          <a:fillRef idx="2">
-            <a:schemeClr val="accent2"/>
-          </a:fillRef>
-          <a:effectRef idx="1">
-            <a:schemeClr val="accent2"/>
-          </a:effectRef>
-          <a:fontRef idx="minor">
-            <a:schemeClr val="dk1"/>
-          </a:fontRef>
-        </p:style>
-      </p:cxnSp>
+              <a:headEnd type="none" w="med" len="med"/>
+              <a:tailEnd type="arrow" w="med" len="med"/>
+            </a:ln>
+            <a:effectLst/>
+          </p:spPr>
+          <p:style>
+            <a:lnRef idx="1">
+              <a:schemeClr val="accent2"/>
+            </a:lnRef>
+            <a:fillRef idx="2">
+              <a:schemeClr val="accent2"/>
+            </a:fillRef>
+            <a:effectRef idx="1">
+              <a:schemeClr val="accent2"/>
+            </a:effectRef>
+            <a:fontRef idx="minor">
+              <a:schemeClr val="dk1"/>
+            </a:fontRef>
+          </p:style>
+        </p:cxnSp>
+      </p:grpSp>
     </p:spTree>
     <p:extLst>
       <p:ext uri="{BB962C8B-B14F-4D97-AF65-F5344CB8AC3E}">

</xml_diff>